<commit_message>
Added powerpoint and docx to notebook output
</commit_message>
<xml_diff>
--- a/EwerDSC530FinalProject.pptx
+++ b/EwerDSC530FinalProject.pptx
@@ -18,25 +18,23 @@
     <p:sldId id="263" r:id="rId13"/>
     <p:sldId id="264" r:id="rId14"/>
     <p:sldId id="265" r:id="rId15"/>
-    <p:sldId id="266" r:id="rId16"/>
-    <p:sldId id="267" r:id="rId17"/>
   </p:sldIdLst>
   <p:sldSz cy="5143500" cx="9144000"/>
   <p:notesSz cx="6858000" cy="9144000"/>
   <p:embeddedFontLst>
     <p:embeddedFont>
       <p:font typeface="Montserrat"/>
-      <p:regular r:id="rId18"/>
-      <p:bold r:id="rId19"/>
-      <p:italic r:id="rId20"/>
-      <p:boldItalic r:id="rId21"/>
+      <p:regular r:id="rId16"/>
+      <p:bold r:id="rId17"/>
+      <p:italic r:id="rId18"/>
+      <p:boldItalic r:id="rId19"/>
     </p:embeddedFont>
     <p:embeddedFont>
       <p:font typeface="Lato"/>
-      <p:regular r:id="rId22"/>
-      <p:bold r:id="rId23"/>
-      <p:italic r:id="rId24"/>
-      <p:boldItalic r:id="rId25"/>
+      <p:regular r:id="rId20"/>
+      <p:bold r:id="rId21"/>
+      <p:italic r:id="rId22"/>
+      <p:boldItalic r:id="rId23"/>
     </p:embeddedFont>
   </p:embeddedFontLst>
   <p:defaultTextStyle>
@@ -817,7 +815,7 @@
   <p:cSld>
     <p:spTree>
       <p:nvGrpSpPr>
-        <p:cNvPr id="184" name="Shape 184"/>
+        <p:cNvPr id="194" name="Shape 194"/>
         <p:cNvGrpSpPr/>
         <p:nvPr/>
       </p:nvGrpSpPr>
@@ -831,7 +829,7 @@
       </p:grpSpPr>
       <p:sp>
         <p:nvSpPr>
-          <p:cNvPr id="185" name="Google Shape;185;g279d91a4030_0_165:notes"/>
+          <p:cNvPr id="195" name="Google Shape;195;g279d91a4030_0_175:notes"/>
           <p:cNvSpPr/>
           <p:nvPr>
             <p:ph idx="2" type="sldImg"/>
@@ -866,205 +864,7 @@
       </p:sp>
       <p:sp>
         <p:nvSpPr>
-          <p:cNvPr id="186" name="Google Shape;186;g279d91a4030_0_165:notes"/>
-          <p:cNvSpPr txBox="1"/>
-          <p:nvPr>
-            <p:ph idx="1" type="body"/>
-          </p:nvPr>
-        </p:nvSpPr>
-        <p:spPr>
-          <a:xfrm>
-            <a:off x="685800" y="4343400"/>
-            <a:ext cx="5486400" cy="4114800"/>
-          </a:xfrm>
-          <a:prstGeom prst="rect">
-            <a:avLst/>
-          </a:prstGeom>
-        </p:spPr>
-        <p:txBody>
-          <a:bodyPr anchorCtr="0" anchor="t" bIns="91425" lIns="91425" spcFirstLastPara="1" rIns="91425" wrap="square" tIns="91425">
-            <a:noAutofit/>
-          </a:bodyPr>
-          <a:lstStyle/>
-          <a:p>
-            <a:pPr indent="0" lvl="0" marL="0" rtl="0" algn="l">
-              <a:spcBef>
-                <a:spcPts val="0"/>
-              </a:spcBef>
-              <a:spcAft>
-                <a:spcPts val="0"/>
-              </a:spcAft>
-              <a:buNone/>
-            </a:pPr>
-            <a:r>
-              <a:t/>
-            </a:r>
-            <a:endParaRPr/>
-          </a:p>
-        </p:txBody>
-      </p:sp>
-    </p:spTree>
-  </p:cSld>
-  <p:clrMapOvr>
-    <a:masterClrMapping/>
-  </p:clrMapOvr>
-</p:notes>
-</file>
-
-<file path=ppt/notesSlides/notesSlide11.xml><?xml version="1.0" encoding="utf-8"?>
-<p:notes xmlns:a="http://schemas.openxmlformats.org/drawingml/2006/main" xmlns:r="http://schemas.openxmlformats.org/officeDocument/2006/relationships" xmlns:mc="http://schemas.openxmlformats.org/markup-compatibility/2006" xmlns:mv="urn:schemas-microsoft-com:mac:vml" xmlns:p="http://schemas.openxmlformats.org/presentationml/2006/main" xmlns:c="http://schemas.openxmlformats.org/drawingml/2006/chart" xmlns:dgm="http://schemas.openxmlformats.org/drawingml/2006/diagram" xmlns:o="urn:schemas-microsoft-com:office:office" xmlns:v="urn:schemas-microsoft-com:vml" xmlns:pvml="urn:schemas-microsoft-com:office:powerpoint" xmlns:com="http://schemas.openxmlformats.org/drawingml/2006/compatibility" xmlns:p14="http://schemas.microsoft.com/office/powerpoint/2010/main" xmlns:p15="http://schemas.microsoft.com/office/powerpoint/2012/main" xmlns:ahyp="http://schemas.microsoft.com/office/drawing/2018/hyperlinkcolor" showMasterPhAnim="0" showMasterSp="0">
-  <p:cSld>
-    <p:spTree>
-      <p:nvGrpSpPr>
-        <p:cNvPr id="190" name="Shape 190"/>
-        <p:cNvGrpSpPr/>
-        <p:nvPr/>
-      </p:nvGrpSpPr>
-      <p:grpSpPr>
-        <a:xfrm>
-          <a:off x="0" y="0"/>
-          <a:ext cx="0" cy="0"/>
-          <a:chOff x="0" y="0"/>
-          <a:chExt cx="0" cy="0"/>
-        </a:xfrm>
-      </p:grpSpPr>
-      <p:sp>
-        <p:nvSpPr>
-          <p:cNvPr id="191" name="Google Shape;191;g279d91a4030_0_170:notes"/>
-          <p:cNvSpPr/>
-          <p:nvPr>
-            <p:ph idx="2" type="sldImg"/>
-          </p:nvPr>
-        </p:nvSpPr>
-        <p:spPr>
-          <a:xfrm>
-            <a:off x="381300" y="685800"/>
-            <a:ext cx="6096000" cy="3429000"/>
-          </a:xfrm>
-          <a:custGeom>
-            <a:rect b="b" l="l" r="r" t="t"/>
-            <a:pathLst>
-              <a:path extrusionOk="0" h="120000" w="120000">
-                <a:moveTo>
-                  <a:pt x="0" y="0"/>
-                </a:moveTo>
-                <a:lnTo>
-                  <a:pt x="120000" y="0"/>
-                </a:lnTo>
-                <a:lnTo>
-                  <a:pt x="120000" y="120000"/>
-                </a:lnTo>
-                <a:lnTo>
-                  <a:pt x="0" y="120000"/>
-                </a:lnTo>
-                <a:close/>
-              </a:path>
-            </a:pathLst>
-          </a:custGeom>
-        </p:spPr>
-      </p:sp>
-      <p:sp>
-        <p:nvSpPr>
-          <p:cNvPr id="192" name="Google Shape;192;g279d91a4030_0_170:notes"/>
-          <p:cNvSpPr txBox="1"/>
-          <p:nvPr>
-            <p:ph idx="1" type="body"/>
-          </p:nvPr>
-        </p:nvSpPr>
-        <p:spPr>
-          <a:xfrm>
-            <a:off x="685800" y="4343400"/>
-            <a:ext cx="5486400" cy="4114800"/>
-          </a:xfrm>
-          <a:prstGeom prst="rect">
-            <a:avLst/>
-          </a:prstGeom>
-        </p:spPr>
-        <p:txBody>
-          <a:bodyPr anchorCtr="0" anchor="t" bIns="91425" lIns="91425" spcFirstLastPara="1" rIns="91425" wrap="square" tIns="91425">
-            <a:noAutofit/>
-          </a:bodyPr>
-          <a:lstStyle/>
-          <a:p>
-            <a:pPr indent="0" lvl="0" marL="0" rtl="0" algn="l">
-              <a:spcBef>
-                <a:spcPts val="0"/>
-              </a:spcBef>
-              <a:spcAft>
-                <a:spcPts val="0"/>
-              </a:spcAft>
-              <a:buNone/>
-            </a:pPr>
-            <a:r>
-              <a:t/>
-            </a:r>
-            <a:endParaRPr/>
-          </a:p>
-        </p:txBody>
-      </p:sp>
-    </p:spTree>
-  </p:cSld>
-  <p:clrMapOvr>
-    <a:masterClrMapping/>
-  </p:clrMapOvr>
-</p:notes>
-</file>
-
-<file path=ppt/notesSlides/notesSlide12.xml><?xml version="1.0" encoding="utf-8"?>
-<p:notes xmlns:a="http://schemas.openxmlformats.org/drawingml/2006/main" xmlns:r="http://schemas.openxmlformats.org/officeDocument/2006/relationships" xmlns:mc="http://schemas.openxmlformats.org/markup-compatibility/2006" xmlns:mv="urn:schemas-microsoft-com:mac:vml" xmlns:p="http://schemas.openxmlformats.org/presentationml/2006/main" xmlns:c="http://schemas.openxmlformats.org/drawingml/2006/chart" xmlns:dgm="http://schemas.openxmlformats.org/drawingml/2006/diagram" xmlns:o="urn:schemas-microsoft-com:office:office" xmlns:v="urn:schemas-microsoft-com:vml" xmlns:pvml="urn:schemas-microsoft-com:office:powerpoint" xmlns:com="http://schemas.openxmlformats.org/drawingml/2006/compatibility" xmlns:p14="http://schemas.microsoft.com/office/powerpoint/2010/main" xmlns:p15="http://schemas.microsoft.com/office/powerpoint/2012/main" xmlns:ahyp="http://schemas.microsoft.com/office/drawing/2018/hyperlinkcolor" showMasterPhAnim="0" showMasterSp="0">
-  <p:cSld>
-    <p:spTree>
-      <p:nvGrpSpPr>
-        <p:cNvPr id="196" name="Shape 196"/>
-        <p:cNvGrpSpPr/>
-        <p:nvPr/>
-      </p:nvGrpSpPr>
-      <p:grpSpPr>
-        <a:xfrm>
-          <a:off x="0" y="0"/>
-          <a:ext cx="0" cy="0"/>
-          <a:chOff x="0" y="0"/>
-          <a:chExt cx="0" cy="0"/>
-        </a:xfrm>
-      </p:grpSpPr>
-      <p:sp>
-        <p:nvSpPr>
-          <p:cNvPr id="197" name="Google Shape;197;g279d91a4030_0_175:notes"/>
-          <p:cNvSpPr/>
-          <p:nvPr>
-            <p:ph idx="2" type="sldImg"/>
-          </p:nvPr>
-        </p:nvSpPr>
-        <p:spPr>
-          <a:xfrm>
-            <a:off x="381300" y="685800"/>
-            <a:ext cx="6096000" cy="3429000"/>
-          </a:xfrm>
-          <a:custGeom>
-            <a:rect b="b" l="l" r="r" t="t"/>
-            <a:pathLst>
-              <a:path extrusionOk="0" h="120000" w="120000">
-                <a:moveTo>
-                  <a:pt x="0" y="0"/>
-                </a:moveTo>
-                <a:lnTo>
-                  <a:pt x="120000" y="0"/>
-                </a:lnTo>
-                <a:lnTo>
-                  <a:pt x="120000" y="120000"/>
-                </a:lnTo>
-                <a:lnTo>
-                  <a:pt x="0" y="120000"/>
-                </a:lnTo>
-                <a:close/>
-              </a:path>
-            </a:pathLst>
-          </a:custGeom>
-        </p:spPr>
-      </p:sp>
-      <p:sp>
-        <p:nvSpPr>
-          <p:cNvPr id="198" name="Google Shape;198;g279d91a4030_0_175:notes"/>
+          <p:cNvPr id="196" name="Google Shape;196;g279d91a4030_0_175:notes"/>
           <p:cNvSpPr txBox="1"/>
           <p:nvPr>
             <p:ph idx="1" type="body"/>
@@ -1312,7 +1112,7 @@
   <p:cSld>
     <p:spTree>
       <p:nvGrpSpPr>
-        <p:cNvPr id="148" name="Shape 148"/>
+        <p:cNvPr id="149" name="Shape 149"/>
         <p:cNvGrpSpPr/>
         <p:nvPr/>
       </p:nvGrpSpPr>
@@ -1326,7 +1126,7 @@
       </p:grpSpPr>
       <p:sp>
         <p:nvSpPr>
-          <p:cNvPr id="149" name="Google Shape;149;g279d91a4030_0_135:notes"/>
+          <p:cNvPr id="150" name="Google Shape;150;g27fa1e9548d_0_7:notes"/>
           <p:cNvSpPr/>
           <p:nvPr>
             <p:ph idx="2" type="sldImg"/>
@@ -1361,7 +1161,7 @@
       </p:sp>
       <p:sp>
         <p:nvSpPr>
-          <p:cNvPr id="150" name="Google Shape;150;g279d91a4030_0_135:notes"/>
+          <p:cNvPr id="151" name="Google Shape;151;g27fa1e9548d_0_7:notes"/>
           <p:cNvSpPr txBox="1"/>
           <p:nvPr>
             <p:ph idx="1" type="body"/>
@@ -1411,7 +1211,7 @@
   <p:cSld>
     <p:spTree>
       <p:nvGrpSpPr>
-        <p:cNvPr id="154" name="Shape 154"/>
+        <p:cNvPr id="156" name="Shape 156"/>
         <p:cNvGrpSpPr/>
         <p:nvPr/>
       </p:nvGrpSpPr>
@@ -1425,7 +1225,7 @@
       </p:grpSpPr>
       <p:sp>
         <p:nvSpPr>
-          <p:cNvPr id="155" name="Google Shape;155;g279d91a4030_0_140:notes"/>
+          <p:cNvPr id="157" name="Google Shape;157;g27fa1e9548d_0_14:notes"/>
           <p:cNvSpPr/>
           <p:nvPr>
             <p:ph idx="2" type="sldImg"/>
@@ -1460,7 +1260,7 @@
       </p:sp>
       <p:sp>
         <p:nvSpPr>
-          <p:cNvPr id="156" name="Google Shape;156;g279d91a4030_0_140:notes"/>
+          <p:cNvPr id="158" name="Google Shape;158;g27fa1e9548d_0_14:notes"/>
           <p:cNvSpPr txBox="1"/>
           <p:nvPr>
             <p:ph idx="1" type="body"/>
@@ -1510,7 +1310,7 @@
   <p:cSld>
     <p:spTree>
       <p:nvGrpSpPr>
-        <p:cNvPr id="160" name="Shape 160"/>
+        <p:cNvPr id="165" name="Shape 165"/>
         <p:cNvGrpSpPr/>
         <p:nvPr/>
       </p:nvGrpSpPr>
@@ -1524,7 +1324,7 @@
       </p:grpSpPr>
       <p:sp>
         <p:nvSpPr>
-          <p:cNvPr id="161" name="Google Shape;161;g279d91a4030_0_145:notes"/>
+          <p:cNvPr id="166" name="Google Shape;166;g27fa1e9548d_0_23:notes"/>
           <p:cNvSpPr/>
           <p:nvPr>
             <p:ph idx="2" type="sldImg"/>
@@ -1559,7 +1359,7 @@
       </p:sp>
       <p:sp>
         <p:nvSpPr>
-          <p:cNvPr id="162" name="Google Shape;162;g279d91a4030_0_145:notes"/>
+          <p:cNvPr id="167" name="Google Shape;167;g27fa1e9548d_0_23:notes"/>
           <p:cNvSpPr txBox="1"/>
           <p:nvPr>
             <p:ph idx="1" type="body"/>
@@ -1609,7 +1409,7 @@
   <p:cSld>
     <p:spTree>
       <p:nvGrpSpPr>
-        <p:cNvPr id="166" name="Shape 166"/>
+        <p:cNvPr id="172" name="Shape 172"/>
         <p:cNvGrpSpPr/>
         <p:nvPr/>
       </p:nvGrpSpPr>
@@ -1623,7 +1423,7 @@
       </p:grpSpPr>
       <p:sp>
         <p:nvSpPr>
-          <p:cNvPr id="167" name="Google Shape;167;g279d91a4030_0_150:notes"/>
+          <p:cNvPr id="173" name="Google Shape;173;g27fa1e9548d_0_32:notes"/>
           <p:cNvSpPr/>
           <p:nvPr>
             <p:ph idx="2" type="sldImg"/>
@@ -1658,7 +1458,7 @@
       </p:sp>
       <p:sp>
         <p:nvSpPr>
-          <p:cNvPr id="168" name="Google Shape;168;g279d91a4030_0_150:notes"/>
+          <p:cNvPr id="174" name="Google Shape;174;g27fa1e9548d_0_32:notes"/>
           <p:cNvSpPr txBox="1"/>
           <p:nvPr>
             <p:ph idx="1" type="body"/>
@@ -1708,7 +1508,7 @@
   <p:cSld>
     <p:spTree>
       <p:nvGrpSpPr>
-        <p:cNvPr id="172" name="Shape 172"/>
+        <p:cNvPr id="179" name="Shape 179"/>
         <p:cNvGrpSpPr/>
         <p:nvPr/>
       </p:nvGrpSpPr>
@@ -1722,7 +1522,7 @@
       </p:grpSpPr>
       <p:sp>
         <p:nvSpPr>
-          <p:cNvPr id="173" name="Google Shape;173;g279d91a4030_0_155:notes"/>
+          <p:cNvPr id="180" name="Google Shape;180;g279d91a4030_0_160:notes"/>
           <p:cNvSpPr/>
           <p:nvPr>
             <p:ph idx="2" type="sldImg"/>
@@ -1757,7 +1557,7 @@
       </p:sp>
       <p:sp>
         <p:nvSpPr>
-          <p:cNvPr id="174" name="Google Shape;174;g279d91a4030_0_155:notes"/>
+          <p:cNvPr id="181" name="Google Shape;181;g279d91a4030_0_160:notes"/>
           <p:cNvSpPr txBox="1"/>
           <p:nvPr>
             <p:ph idx="1" type="body"/>
@@ -1807,7 +1607,7 @@
   <p:cSld>
     <p:spTree>
       <p:nvGrpSpPr>
-        <p:cNvPr id="178" name="Shape 178"/>
+        <p:cNvPr id="187" name="Shape 187"/>
         <p:cNvGrpSpPr/>
         <p:nvPr/>
       </p:nvGrpSpPr>
@@ -1821,7 +1621,7 @@
       </p:grpSpPr>
       <p:sp>
         <p:nvSpPr>
-          <p:cNvPr id="179" name="Google Shape;179;g279d91a4030_0_160:notes"/>
+          <p:cNvPr id="188" name="Google Shape;188;g279d91a4030_0_170:notes"/>
           <p:cNvSpPr/>
           <p:nvPr>
             <p:ph idx="2" type="sldImg"/>
@@ -1856,7 +1656,7 @@
       </p:sp>
       <p:sp>
         <p:nvSpPr>
-          <p:cNvPr id="180" name="Google Shape;180;g279d91a4030_0_160:notes"/>
+          <p:cNvPr id="189" name="Google Shape;189;g279d91a4030_0_170:notes"/>
           <p:cNvSpPr txBox="1"/>
           <p:nvPr>
             <p:ph idx="1" type="body"/>
@@ -10160,56 +9960,68 @@
         </p:spPr>
         <p:txBody>
           <a:bodyPr anchorCtr="0" anchor="t" bIns="91425" lIns="91425" spcFirstLastPara="1" rIns="91425" wrap="square" tIns="91425">
-            <a:normAutofit fontScale="62500" lnSpcReduction="20000"/>
+            <a:noAutofit/>
           </a:bodyPr>
           <a:lstStyle/>
           <a:p>
             <a:pPr indent="0" lvl="0" marL="0" rtl="0" algn="l">
-              <a:spcBef>
-                <a:spcPts val="0"/>
-              </a:spcBef>
-              <a:spcAft>
-                <a:spcPts val="0"/>
-              </a:spcAft>
+              <a:lnSpc>
+                <a:spcPct val="115000"/>
+              </a:lnSpc>
+              <a:spcBef>
+                <a:spcPts val="0"/>
+              </a:spcBef>
+              <a:spcAft>
+                <a:spcPts val="0"/>
+              </a:spcAft>
+              <a:buSzPts val="688"/>
               <a:buNone/>
             </a:pPr>
             <a:r>
-              <a:rPr lang="en"/>
+              <a:rPr lang="en" sz="1512"/>
               <a:t>Joshua Ewer</a:t>
             </a:r>
-            <a:endParaRPr/>
+            <a:endParaRPr sz="1512"/>
           </a:p>
           <a:p>
             <a:pPr indent="0" lvl="0" marL="0" rtl="0" algn="l">
-              <a:spcBef>
-                <a:spcPts val="0"/>
-              </a:spcBef>
-              <a:spcAft>
-                <a:spcPts val="0"/>
-              </a:spcAft>
+              <a:lnSpc>
+                <a:spcPct val="115000"/>
+              </a:lnSpc>
+              <a:spcBef>
+                <a:spcPts val="0"/>
+              </a:spcBef>
+              <a:spcAft>
+                <a:spcPts val="0"/>
+              </a:spcAft>
+              <a:buSzPts val="688"/>
               <a:buNone/>
             </a:pPr>
             <a:r>
-              <a:rPr lang="en"/>
+              <a:rPr lang="en" sz="1512"/>
               <a:t>Bellevue University</a:t>
             </a:r>
-            <a:endParaRPr/>
+            <a:endParaRPr sz="1512"/>
           </a:p>
           <a:p>
             <a:pPr indent="0" lvl="0" marL="0" rtl="0" algn="l">
-              <a:spcBef>
-                <a:spcPts val="0"/>
-              </a:spcBef>
-              <a:spcAft>
-                <a:spcPts val="0"/>
-              </a:spcAft>
+              <a:lnSpc>
+                <a:spcPct val="115000"/>
+              </a:lnSpc>
+              <a:spcBef>
+                <a:spcPts val="0"/>
+              </a:spcBef>
+              <a:spcAft>
+                <a:spcPts val="0"/>
+              </a:spcAft>
+              <a:buSzPts val="688"/>
               <a:buNone/>
             </a:pPr>
             <a:r>
-              <a:rPr lang="en"/>
+              <a:rPr lang="en" sz="1512"/>
               <a:t>August 9, 2024</a:t>
             </a:r>
-            <a:endParaRPr/>
+            <a:endParaRPr sz="1512"/>
           </a:p>
         </p:txBody>
       </p:sp>
@@ -10226,7 +10038,7 @@
   <p:cSld>
     <p:spTree>
       <p:nvGrpSpPr>
-        <p:cNvPr id="187" name="Shape 187"/>
+        <p:cNvPr id="197" name="Shape 197"/>
         <p:cNvGrpSpPr/>
         <p:nvPr/>
       </p:nvGrpSpPr>
@@ -10240,7 +10052,7 @@
       </p:grpSpPr>
       <p:sp>
         <p:nvSpPr>
-          <p:cNvPr id="188" name="Google Shape;188;p22"/>
+          <p:cNvPr id="198" name="Google Shape;198;p22"/>
           <p:cNvSpPr txBox="1"/>
           <p:nvPr>
             <p:ph type="title"/>
@@ -10272,7 +10084,7 @@
             </a:pPr>
             <a:r>
               <a:rPr lang="en"/>
-              <a:t>Analytical Distribution</a:t>
+              <a:t>Regression Analysis</a:t>
             </a:r>
             <a:endParaRPr/>
           </a:p>
@@ -10280,7 +10092,7 @@
       </p:sp>
       <p:sp>
         <p:nvSpPr>
-          <p:cNvPr id="189" name="Google Shape;189;p22"/>
+          <p:cNvPr id="199" name="Google Shape;199;p22"/>
           <p:cNvSpPr txBox="1"/>
           <p:nvPr>
             <p:ph idx="1" type="body"/>
@@ -10288,8 +10100,8 @@
         </p:nvSpPr>
         <p:spPr>
           <a:xfrm>
-            <a:off x="1297500" y="1567550"/>
-            <a:ext cx="7038900" cy="2911200"/>
+            <a:off x="1297500" y="1062075"/>
+            <a:ext cx="4265700" cy="3818400"/>
           </a:xfrm>
           <a:prstGeom prst="rect">
             <a:avLst/>
@@ -10297,13 +10109,85 @@
         </p:spPr>
         <p:txBody>
           <a:bodyPr anchorCtr="0" anchor="t" bIns="91425" lIns="91425" spcFirstLastPara="1" rIns="91425" wrap="square" tIns="91425">
-            <a:normAutofit/>
+            <a:normAutofit fontScale="85000" lnSpcReduction="20000"/>
           </a:bodyPr>
           <a:lstStyle/>
           <a:p>
+            <a:pPr indent="-320357" lvl="0" marL="457200" rtl="0" algn="l">
+              <a:spcBef>
+                <a:spcPts val="0"/>
+              </a:spcBef>
+              <a:spcAft>
+                <a:spcPts val="0"/>
+              </a:spcAft>
+              <a:buSzPct val="100000"/>
+              <a:buChar char="●"/>
+            </a:pPr>
+            <a:r>
+              <a:rPr lang="en" sz="1700"/>
+              <a:t>In r</a:t>
+            </a:r>
+            <a:r>
+              <a:rPr lang="en" sz="1700"/>
+              <a:t>eviewing the results from the regression analysis, we can conclude:</a:t>
+            </a:r>
+            <a:endParaRPr sz="1700"/>
+          </a:p>
+          <a:p>
+            <a:pPr indent="-320357" lvl="1" marL="914400" rtl="0" algn="l">
+              <a:spcBef>
+                <a:spcPts val="0"/>
+              </a:spcBef>
+              <a:spcAft>
+                <a:spcPts val="0"/>
+              </a:spcAft>
+              <a:buSzPct val="100000"/>
+              <a:buAutoNum type="alphaLcPeriod"/>
+            </a:pPr>
+            <a:r>
+              <a:rPr lang="en" sz="1700"/>
+              <a:t>The R-squared value is greater than 0.5 so it is better than random, though not a large amount. An r-squared value that approaches 1 is a better fit.</a:t>
+            </a:r>
+            <a:endParaRPr sz="1700"/>
+          </a:p>
+          <a:p>
+            <a:pPr indent="-320357" lvl="1" marL="914400" rtl="0" algn="l">
+              <a:spcBef>
+                <a:spcPts val="0"/>
+              </a:spcBef>
+              <a:spcAft>
+                <a:spcPts val="0"/>
+              </a:spcAft>
+              <a:buSzPct val="100000"/>
+              <a:buAutoNum type="alphaLcPeriod"/>
+            </a:pPr>
+            <a:r>
+              <a:rPr lang="en" sz="1700"/>
+              <a:t>Durbin-Watson measures homoscedasticity, and a low number of 0.179 implies a strong positive serial correlation in the residuals.</a:t>
+            </a:r>
+            <a:endParaRPr sz="1700"/>
+          </a:p>
+          <a:p>
+            <a:pPr indent="-320357" lvl="1" marL="914400" rtl="0" algn="l">
+              <a:spcBef>
+                <a:spcPts val="0"/>
+              </a:spcBef>
+              <a:spcAft>
+                <a:spcPts val="0"/>
+              </a:spcAft>
+              <a:buSzPct val="100000"/>
+              <a:buAutoNum type="alphaLcPeriod"/>
+            </a:pPr>
+            <a:r>
+              <a:rPr lang="en" sz="1700"/>
+              <a:t>The kurtosis value of 5.5 implies that there are more extreme values in the distribution that would be a normal distribution. Therefore, there must be significant outliers or extreme values.</a:t>
+            </a:r>
+            <a:endParaRPr sz="1700"/>
+          </a:p>
+          <a:p>
             <a:pPr indent="0" lvl="0" marL="0" rtl="0" algn="l">
               <a:spcBef>
-                <a:spcPts val="0"/>
+                <a:spcPts val="1200"/>
               </a:spcBef>
               <a:spcAft>
                 <a:spcPts val="1200"/>
@@ -10317,214 +10201,34 @@
           </a:p>
         </p:txBody>
       </p:sp>
-    </p:spTree>
-  </p:cSld>
-  <p:clrMapOvr>
-    <a:masterClrMapping/>
-  </p:clrMapOvr>
-</p:sld>
-</file>
-
-<file path=ppt/slides/slide11.xml><?xml version="1.0" encoding="utf-8"?>
-<p:sld xmlns:a="http://schemas.openxmlformats.org/drawingml/2006/main" xmlns:r="http://schemas.openxmlformats.org/officeDocument/2006/relationships" xmlns:mc="http://schemas.openxmlformats.org/markup-compatibility/2006" xmlns:mv="urn:schemas-microsoft-com:mac:vml" xmlns:p="http://schemas.openxmlformats.org/presentationml/2006/main" xmlns:c="http://schemas.openxmlformats.org/drawingml/2006/chart" xmlns:dgm="http://schemas.openxmlformats.org/drawingml/2006/diagram" xmlns:o="urn:schemas-microsoft-com:office:office" xmlns:v="urn:schemas-microsoft-com:vml" xmlns:pvml="urn:schemas-microsoft-com:office:powerpoint" xmlns:com="http://schemas.openxmlformats.org/drawingml/2006/compatibility" xmlns:p14="http://schemas.microsoft.com/office/powerpoint/2010/main" xmlns:p15="http://schemas.microsoft.com/office/powerpoint/2012/main" xmlns:ahyp="http://schemas.microsoft.com/office/drawing/2018/hyperlinkcolor">
-  <p:cSld>
-    <p:spTree>
-      <p:nvGrpSpPr>
-        <p:cNvPr id="193" name="Shape 193"/>
-        <p:cNvGrpSpPr/>
-        <p:nvPr/>
-      </p:nvGrpSpPr>
-      <p:grpSpPr>
-        <a:xfrm>
-          <a:off x="0" y="0"/>
-          <a:ext cx="0" cy="0"/>
-          <a:chOff x="0" y="0"/>
-          <a:chExt cx="0" cy="0"/>
-        </a:xfrm>
-      </p:grpSpPr>
-      <p:sp>
-        <p:nvSpPr>
-          <p:cNvPr id="194" name="Google Shape;194;p23"/>
-          <p:cNvSpPr txBox="1"/>
-          <p:nvPr>
-            <p:ph type="title"/>
-          </p:nvPr>
-        </p:nvSpPr>
+      <p:pic>
+        <p:nvPicPr>
+          <p:cNvPr id="200" name="Google Shape;200;p22"/>
+          <p:cNvPicPr preferRelativeResize="0"/>
+          <p:nvPr/>
+        </p:nvPicPr>
+        <p:blipFill>
+          <a:blip r:embed="rId3">
+            <a:alphaModFix/>
+          </a:blip>
+          <a:stretch>
+            <a:fillRect/>
+          </a:stretch>
+        </p:blipFill>
         <p:spPr>
           <a:xfrm>
-            <a:off x="1297500" y="393750"/>
-            <a:ext cx="7038900" cy="914100"/>
+            <a:off x="5897075" y="483350"/>
+            <a:ext cx="3070025" cy="4397174"/>
           </a:xfrm>
           <a:prstGeom prst="rect">
             <a:avLst/>
           </a:prstGeom>
+          <a:noFill/>
+          <a:ln>
+            <a:noFill/>
+          </a:ln>
         </p:spPr>
-        <p:txBody>
-          <a:bodyPr anchorCtr="0" anchor="t" bIns="91425" lIns="91425" spcFirstLastPara="1" rIns="91425" wrap="square" tIns="91425">
-            <a:normAutofit/>
-          </a:bodyPr>
-          <a:lstStyle/>
-          <a:p>
-            <a:pPr indent="0" lvl="0" marL="0" rtl="0" algn="l">
-              <a:spcBef>
-                <a:spcPts val="0"/>
-              </a:spcBef>
-              <a:spcAft>
-                <a:spcPts val="0"/>
-              </a:spcAft>
-              <a:buNone/>
-            </a:pPr>
-            <a:r>
-              <a:rPr lang="en"/>
-              <a:t>Scatter Plots</a:t>
-            </a:r>
-            <a:endParaRPr/>
-          </a:p>
-        </p:txBody>
-      </p:sp>
-      <p:sp>
-        <p:nvSpPr>
-          <p:cNvPr id="195" name="Google Shape;195;p23"/>
-          <p:cNvSpPr txBox="1"/>
-          <p:nvPr>
-            <p:ph idx="1" type="body"/>
-          </p:nvPr>
-        </p:nvSpPr>
-        <p:spPr>
-          <a:xfrm>
-            <a:off x="1297500" y="1567550"/>
-            <a:ext cx="7038900" cy="2911200"/>
-          </a:xfrm>
-          <a:prstGeom prst="rect">
-            <a:avLst/>
-          </a:prstGeom>
-        </p:spPr>
-        <p:txBody>
-          <a:bodyPr anchorCtr="0" anchor="t" bIns="91425" lIns="91425" spcFirstLastPara="1" rIns="91425" wrap="square" tIns="91425">
-            <a:normAutofit/>
-          </a:bodyPr>
-          <a:lstStyle/>
-          <a:p>
-            <a:pPr indent="0" lvl="0" marL="0" rtl="0" algn="l">
-              <a:spcBef>
-                <a:spcPts val="0"/>
-              </a:spcBef>
-              <a:spcAft>
-                <a:spcPts val="1200"/>
-              </a:spcAft>
-              <a:buNone/>
-            </a:pPr>
-            <a:r>
-              <a:t/>
-            </a:r>
-            <a:endParaRPr/>
-          </a:p>
-        </p:txBody>
-      </p:sp>
-    </p:spTree>
-  </p:cSld>
-  <p:clrMapOvr>
-    <a:masterClrMapping/>
-  </p:clrMapOvr>
-</p:sld>
-</file>
-
-<file path=ppt/slides/slide12.xml><?xml version="1.0" encoding="utf-8"?>
-<p:sld xmlns:a="http://schemas.openxmlformats.org/drawingml/2006/main" xmlns:r="http://schemas.openxmlformats.org/officeDocument/2006/relationships" xmlns:mc="http://schemas.openxmlformats.org/markup-compatibility/2006" xmlns:mv="urn:schemas-microsoft-com:mac:vml" xmlns:p="http://schemas.openxmlformats.org/presentationml/2006/main" xmlns:c="http://schemas.openxmlformats.org/drawingml/2006/chart" xmlns:dgm="http://schemas.openxmlformats.org/drawingml/2006/diagram" xmlns:o="urn:schemas-microsoft-com:office:office" xmlns:v="urn:schemas-microsoft-com:vml" xmlns:pvml="urn:schemas-microsoft-com:office:powerpoint" xmlns:com="http://schemas.openxmlformats.org/drawingml/2006/compatibility" xmlns:p14="http://schemas.microsoft.com/office/powerpoint/2010/main" xmlns:p15="http://schemas.microsoft.com/office/powerpoint/2012/main" xmlns:ahyp="http://schemas.microsoft.com/office/drawing/2018/hyperlinkcolor">
-  <p:cSld>
-    <p:spTree>
-      <p:nvGrpSpPr>
-        <p:cNvPr id="199" name="Shape 199"/>
-        <p:cNvGrpSpPr/>
-        <p:nvPr/>
-      </p:nvGrpSpPr>
-      <p:grpSpPr>
-        <a:xfrm>
-          <a:off x="0" y="0"/>
-          <a:ext cx="0" cy="0"/>
-          <a:chOff x="0" y="0"/>
-          <a:chExt cx="0" cy="0"/>
-        </a:xfrm>
-      </p:grpSpPr>
-      <p:sp>
-        <p:nvSpPr>
-          <p:cNvPr id="200" name="Google Shape;200;p24"/>
-          <p:cNvSpPr txBox="1"/>
-          <p:nvPr>
-            <p:ph type="title"/>
-          </p:nvPr>
-        </p:nvSpPr>
-        <p:spPr>
-          <a:xfrm>
-            <a:off x="1297500" y="393750"/>
-            <a:ext cx="7038900" cy="914100"/>
-          </a:xfrm>
-          <a:prstGeom prst="rect">
-            <a:avLst/>
-          </a:prstGeom>
-        </p:spPr>
-        <p:txBody>
-          <a:bodyPr anchorCtr="0" anchor="t" bIns="91425" lIns="91425" spcFirstLastPara="1" rIns="91425" wrap="square" tIns="91425">
-            <a:normAutofit/>
-          </a:bodyPr>
-          <a:lstStyle/>
-          <a:p>
-            <a:pPr indent="0" lvl="0" marL="0" rtl="0" algn="l">
-              <a:spcBef>
-                <a:spcPts val="0"/>
-              </a:spcBef>
-              <a:spcAft>
-                <a:spcPts val="0"/>
-              </a:spcAft>
-              <a:buNone/>
-            </a:pPr>
-            <a:r>
-              <a:rPr lang="en"/>
-              <a:t>Regression Analysis</a:t>
-            </a:r>
-            <a:endParaRPr/>
-          </a:p>
-        </p:txBody>
-      </p:sp>
-      <p:sp>
-        <p:nvSpPr>
-          <p:cNvPr id="201" name="Google Shape;201;p24"/>
-          <p:cNvSpPr txBox="1"/>
-          <p:nvPr>
-            <p:ph idx="1" type="body"/>
-          </p:nvPr>
-        </p:nvSpPr>
-        <p:spPr>
-          <a:xfrm>
-            <a:off x="1297500" y="1567550"/>
-            <a:ext cx="7038900" cy="2911200"/>
-          </a:xfrm>
-          <a:prstGeom prst="rect">
-            <a:avLst/>
-          </a:prstGeom>
-        </p:spPr>
-        <p:txBody>
-          <a:bodyPr anchorCtr="0" anchor="t" bIns="91425" lIns="91425" spcFirstLastPara="1" rIns="91425" wrap="square" tIns="91425">
-            <a:normAutofit/>
-          </a:bodyPr>
-          <a:lstStyle/>
-          <a:p>
-            <a:pPr indent="0" lvl="0" marL="0" rtl="0" algn="l">
-              <a:spcBef>
-                <a:spcPts val="0"/>
-              </a:spcBef>
-              <a:spcAft>
-                <a:spcPts val="1200"/>
-              </a:spcAft>
-              <a:buNone/>
-            </a:pPr>
-            <a:r>
-              <a:t/>
-            </a:r>
-            <a:endParaRPr/>
-          </a:p>
-        </p:txBody>
-      </p:sp>
+      </p:pic>
     </p:spTree>
   </p:cSld>
   <p:clrMapOvr>
@@ -10610,6 +10314,15 @@
           <a:prstGeom prst="rect">
             <a:avLst/>
           </a:prstGeom>
+          <a:ln cap="flat" cmpd="sng" w="9525">
+            <a:solidFill>
+              <a:schemeClr val="lt1"/>
+            </a:solidFill>
+            <a:prstDash val="solid"/>
+            <a:round/>
+            <a:headEnd len="sm" w="sm" type="none"/>
+            <a:tailEnd len="sm" w="sm" type="none"/>
+          </a:ln>
         </p:spPr>
         <p:txBody>
           <a:bodyPr anchorCtr="0" anchor="t" bIns="91425" lIns="91425" spcFirstLastPara="1" rIns="91425" wrap="square" tIns="91425">
@@ -10622,12 +10335,42 @@
                 <a:spcPts val="0"/>
               </a:spcBef>
               <a:spcAft>
-                <a:spcPts val="1200"/>
+                <a:spcPts val="0"/>
               </a:spcAft>
               <a:buNone/>
             </a:pPr>
             <a:r>
-              <a:t/>
+              <a:rPr lang="en"/>
+              <a:t>I recently experienced an unexpected death in the family, and it got me wondering if there are any specific variables that contribute to life expectancy more than others.  I found several World Health Organization (WHO) datasets that were extremely large and full of sketchy data.  Then, I found a </a:t>
+            </a:r>
+            <a:r>
+              <a:rPr lang="en" u="sng">
+                <a:solidFill>
+                  <a:schemeClr val="hlink"/>
+                </a:solidFill>
+                <a:hlinkClick r:id="rId3"/>
+              </a:rPr>
+              <a:t>sample dataset on kaggle</a:t>
+            </a:r>
+            <a:r>
+              <a:rPr lang="en"/>
+              <a:t> that included some data cleaning to help reduce some of the unrealistic values in the raw dataset.  </a:t>
+            </a:r>
+            <a:endParaRPr/>
+          </a:p>
+          <a:p>
+            <a:pPr indent="0" lvl="0" marL="0" rtl="0" algn="l">
+              <a:spcBef>
+                <a:spcPts val="1200"/>
+              </a:spcBef>
+              <a:spcAft>
+                <a:spcPts val="1200"/>
+              </a:spcAft>
+              <a:buNone/>
+            </a:pPr>
+            <a:r>
+              <a:rPr lang="en"/>
+              <a:t>I chose this dataset to answer the question “What factors have the largest correlation with life expectancy?”</a:t>
             </a:r>
             <a:endParaRPr/>
           </a:p>
@@ -10708,8 +10451,8 @@
         </p:nvSpPr>
         <p:spPr>
           <a:xfrm>
-            <a:off x="1297500" y="1567550"/>
-            <a:ext cx="7038900" cy="2911200"/>
+            <a:off x="1213800" y="1021625"/>
+            <a:ext cx="3307800" cy="4015800"/>
           </a:xfrm>
           <a:prstGeom prst="rect">
             <a:avLst/>
@@ -10717,13 +10460,129 @@
         </p:spPr>
         <p:txBody>
           <a:bodyPr anchorCtr="0" anchor="t" bIns="91425" lIns="91425" spcFirstLastPara="1" rIns="91425" wrap="square" tIns="91425">
-            <a:normAutofit/>
+            <a:normAutofit fontScale="77500" lnSpcReduction="10000"/>
           </a:bodyPr>
           <a:lstStyle/>
           <a:p>
             <a:pPr indent="0" lvl="0" marL="0" rtl="0" algn="l">
               <a:spcBef>
                 <a:spcPts val="0"/>
+              </a:spcBef>
+              <a:spcAft>
+                <a:spcPts val="0"/>
+              </a:spcAft>
+              <a:buNone/>
+            </a:pPr>
+            <a:r>
+              <a:rPr b="1" lang="en" sz="1800"/>
+              <a:t>life_expect </a:t>
+            </a:r>
+            <a:endParaRPr sz="1800"/>
+          </a:p>
+          <a:p>
+            <a:pPr indent="-317182" lvl="1" marL="914400" rtl="0" algn="l">
+              <a:lnSpc>
+                <a:spcPct val="115000"/>
+              </a:lnSpc>
+              <a:spcBef>
+                <a:spcPts val="1200"/>
+              </a:spcBef>
+              <a:spcAft>
+                <a:spcPts val="0"/>
+              </a:spcAft>
+              <a:buSzPct val="100000"/>
+              <a:buAutoNum type="alphaLcPeriod"/>
+            </a:pPr>
+            <a:r>
+              <a:rPr lang="en" sz="1800"/>
+              <a:t>This is the dependent variable for the regression analysis later.</a:t>
+            </a:r>
+            <a:endParaRPr sz="1800"/>
+          </a:p>
+          <a:p>
+            <a:pPr indent="0" lvl="0" marL="914400" rtl="0" algn="l">
+              <a:lnSpc>
+                <a:spcPct val="115000"/>
+              </a:lnSpc>
+              <a:spcBef>
+                <a:spcPts val="1200"/>
+              </a:spcBef>
+              <a:spcAft>
+                <a:spcPts val="0"/>
+              </a:spcAft>
+              <a:buNone/>
+            </a:pPr>
+            <a:r>
+              <a:t/>
+            </a:r>
+            <a:endParaRPr sz="1800"/>
+          </a:p>
+          <a:p>
+            <a:pPr indent="-317182" lvl="1" marL="914400" rtl="0" algn="l">
+              <a:lnSpc>
+                <a:spcPct val="115000"/>
+              </a:lnSpc>
+              <a:spcBef>
+                <a:spcPts val="1200"/>
+              </a:spcBef>
+              <a:spcAft>
+                <a:spcPts val="0"/>
+              </a:spcAft>
+              <a:buSzPct val="100000"/>
+              <a:buAutoNum type="alphaLcPeriod"/>
+            </a:pPr>
+            <a:r>
+              <a:rPr lang="en" sz="1800"/>
+              <a:t>Definition: Life expectancy at birth measured in years</a:t>
+            </a:r>
+            <a:endParaRPr sz="1800"/>
+          </a:p>
+          <a:p>
+            <a:pPr indent="0" lvl="0" marL="914400" rtl="0" algn="l">
+              <a:lnSpc>
+                <a:spcPct val="115000"/>
+              </a:lnSpc>
+              <a:spcBef>
+                <a:spcPts val="1200"/>
+              </a:spcBef>
+              <a:spcAft>
+                <a:spcPts val="0"/>
+              </a:spcAft>
+              <a:buNone/>
+            </a:pPr>
+            <a:r>
+              <a:t/>
+            </a:r>
+            <a:endParaRPr sz="1800"/>
+          </a:p>
+          <a:p>
+            <a:pPr indent="-317182" lvl="1" marL="914400" rtl="0" algn="l">
+              <a:lnSpc>
+                <a:spcPct val="115000"/>
+              </a:lnSpc>
+              <a:spcBef>
+                <a:spcPts val="1200"/>
+              </a:spcBef>
+              <a:spcAft>
+                <a:spcPts val="0"/>
+              </a:spcAft>
+              <a:buSzPct val="100000"/>
+              <a:buAutoNum type="alphaLcPeriod"/>
+            </a:pPr>
+            <a:r>
+              <a:rPr lang="en" sz="1800"/>
+              <a:t>While </a:t>
+            </a:r>
+            <a:r>
+              <a:rPr lang="en" sz="1800"/>
+              <a:t>there is a slight tail in this left skewed distribution, there were no significant outliers to handle</a:t>
+            </a:r>
+            <a:endParaRPr sz="1800"/>
+          </a:p>
+          <a:p>
+            <a:pPr indent="0" lvl="0" marL="0" rtl="0" algn="l">
+              <a:spcBef>
+                <a:spcPts val="1200"/>
               </a:spcBef>
               <a:spcAft>
                 <a:spcPts val="1200"/>
@@ -10737,6 +10596,34 @@
           </a:p>
         </p:txBody>
       </p:sp>
+      <p:pic>
+        <p:nvPicPr>
+          <p:cNvPr id="148" name="Google Shape;148;p15"/>
+          <p:cNvPicPr preferRelativeResize="0"/>
+          <p:nvPr/>
+        </p:nvPicPr>
+        <p:blipFill>
+          <a:blip r:embed="rId3">
+            <a:alphaModFix/>
+          </a:blip>
+          <a:stretch>
+            <a:fillRect/>
+          </a:stretch>
+        </p:blipFill>
+        <p:spPr>
+          <a:xfrm>
+            <a:off x="4966500" y="925197"/>
+            <a:ext cx="3911825" cy="2633500"/>
+          </a:xfrm>
+          <a:prstGeom prst="rect">
+            <a:avLst/>
+          </a:prstGeom>
+          <a:noFill/>
+          <a:ln>
+            <a:noFill/>
+          </a:ln>
+        </p:spPr>
+      </p:pic>
     </p:spTree>
   </p:cSld>
   <p:clrMapOvr>
@@ -10750,7 +10637,7 @@
   <p:cSld>
     <p:spTree>
       <p:nvGrpSpPr>
-        <p:cNvPr id="151" name="Shape 151"/>
+        <p:cNvPr id="152" name="Shape 152"/>
         <p:cNvGrpSpPr/>
         <p:nvPr/>
       </p:nvGrpSpPr>
@@ -10764,7 +10651,7 @@
       </p:grpSpPr>
       <p:sp>
         <p:nvSpPr>
-          <p:cNvPr id="152" name="Google Shape;152;p16"/>
+          <p:cNvPr id="153" name="Google Shape;153;p16"/>
           <p:cNvSpPr txBox="1"/>
           <p:nvPr>
             <p:ph type="title"/>
@@ -10804,7 +10691,7 @@
       </p:sp>
       <p:sp>
         <p:nvSpPr>
-          <p:cNvPr id="153" name="Google Shape;153;p16"/>
+          <p:cNvPr id="154" name="Google Shape;154;p16"/>
           <p:cNvSpPr txBox="1"/>
           <p:nvPr>
             <p:ph idx="1" type="body"/>
@@ -10812,8 +10699,8 @@
         </p:nvSpPr>
         <p:spPr>
           <a:xfrm>
-            <a:off x="1297500" y="1567550"/>
-            <a:ext cx="7038900" cy="2911200"/>
+            <a:off x="1213800" y="1021625"/>
+            <a:ext cx="3307800" cy="4015800"/>
           </a:xfrm>
           <a:prstGeom prst="rect">
             <a:avLst/>
@@ -10821,13 +10708,87 @@
         </p:spPr>
         <p:txBody>
           <a:bodyPr anchorCtr="0" anchor="t" bIns="91425" lIns="91425" spcFirstLastPara="1" rIns="91425" wrap="square" tIns="91425">
-            <a:normAutofit/>
+            <a:normAutofit fontScale="77500" lnSpcReduction="10000"/>
           </a:bodyPr>
           <a:lstStyle/>
           <a:p>
             <a:pPr indent="0" lvl="0" marL="0" rtl="0" algn="l">
               <a:spcBef>
                 <a:spcPts val="0"/>
+              </a:spcBef>
+              <a:spcAft>
+                <a:spcPts val="0"/>
+              </a:spcAft>
+              <a:buNone/>
+            </a:pPr>
+            <a:r>
+              <a:rPr b="1" lang="en" sz="1800"/>
+              <a:t>bmi</a:t>
+            </a:r>
+            <a:endParaRPr sz="1800"/>
+          </a:p>
+          <a:p>
+            <a:pPr indent="-317182" lvl="1" marL="914400" rtl="0" algn="l">
+              <a:lnSpc>
+                <a:spcPct val="115000"/>
+              </a:lnSpc>
+              <a:spcBef>
+                <a:spcPts val="1200"/>
+              </a:spcBef>
+              <a:spcAft>
+                <a:spcPts val="0"/>
+              </a:spcAft>
+              <a:buSzPct val="100000"/>
+              <a:buAutoNum type="alphaLcPeriod"/>
+            </a:pPr>
+            <a:r>
+              <a:rPr lang="en" sz="1800"/>
+              <a:t>Definition: This is calculated by an individual’s weight (kg) / height^2 (meters) and is a rough way to estimate health of an individual.  This data is age-standardized (per 100k population).</a:t>
+            </a:r>
+            <a:endParaRPr sz="1800"/>
+          </a:p>
+          <a:p>
+            <a:pPr indent="0" lvl="0" marL="914400" rtl="0" algn="l">
+              <a:lnSpc>
+                <a:spcPct val="115000"/>
+              </a:lnSpc>
+              <a:spcBef>
+                <a:spcPts val="1200"/>
+              </a:spcBef>
+              <a:spcAft>
+                <a:spcPts val="0"/>
+              </a:spcAft>
+              <a:buNone/>
+            </a:pPr>
+            <a:r>
+              <a:t/>
+            </a:r>
+            <a:endParaRPr sz="1800"/>
+          </a:p>
+          <a:p>
+            <a:pPr indent="-317182" lvl="1" marL="914400" rtl="0" algn="l">
+              <a:lnSpc>
+                <a:spcPct val="115000"/>
+              </a:lnSpc>
+              <a:spcBef>
+                <a:spcPts val="1200"/>
+              </a:spcBef>
+              <a:spcAft>
+                <a:spcPts val="0"/>
+              </a:spcAft>
+              <a:buSzPct val="100000"/>
+              <a:buAutoNum type="alphaLcPeriod"/>
+            </a:pPr>
+            <a:r>
+              <a:rPr lang="en" sz="1800"/>
+              <a:t>This distribution is bimodal, with peaks at 22-24 and 26.  There were no significant outliers.</a:t>
+            </a:r>
+            <a:endParaRPr sz="1800"/>
+          </a:p>
+          <a:p>
+            <a:pPr indent="0" lvl="0" marL="0" rtl="0" algn="l">
+              <a:spcBef>
+                <a:spcPts val="1200"/>
               </a:spcBef>
               <a:spcAft>
                 <a:spcPts val="1200"/>
@@ -10841,6 +10802,34 @@
           </a:p>
         </p:txBody>
       </p:sp>
+      <p:pic>
+        <p:nvPicPr>
+          <p:cNvPr id="155" name="Google Shape;155;p16"/>
+          <p:cNvPicPr preferRelativeResize="0"/>
+          <p:nvPr/>
+        </p:nvPicPr>
+        <p:blipFill>
+          <a:blip r:embed="rId3">
+            <a:alphaModFix/>
+          </a:blip>
+          <a:stretch>
+            <a:fillRect/>
+          </a:stretch>
+        </p:blipFill>
+        <p:spPr>
+          <a:xfrm>
+            <a:off x="4715150" y="1376525"/>
+            <a:ext cx="4317599" cy="2835551"/>
+          </a:xfrm>
+          <a:prstGeom prst="rect">
+            <a:avLst/>
+          </a:prstGeom>
+          <a:noFill/>
+          <a:ln>
+            <a:noFill/>
+          </a:ln>
+        </p:spPr>
+      </p:pic>
     </p:spTree>
   </p:cSld>
   <p:clrMapOvr>
@@ -10854,7 +10843,7 @@
   <p:cSld>
     <p:spTree>
       <p:nvGrpSpPr>
-        <p:cNvPr id="157" name="Shape 157"/>
+        <p:cNvPr id="159" name="Shape 159"/>
         <p:cNvGrpSpPr/>
         <p:nvPr/>
       </p:nvGrpSpPr>
@@ -10868,7 +10857,7 @@
       </p:grpSpPr>
       <p:sp>
         <p:nvSpPr>
-          <p:cNvPr id="158" name="Google Shape;158;p17"/>
+          <p:cNvPr id="160" name="Google Shape;160;p17"/>
           <p:cNvSpPr txBox="1"/>
           <p:nvPr>
             <p:ph type="title"/>
@@ -10908,7 +10897,7 @@
       </p:sp>
       <p:sp>
         <p:nvSpPr>
-          <p:cNvPr id="159" name="Google Shape;159;p17"/>
+          <p:cNvPr id="161" name="Google Shape;161;p17"/>
           <p:cNvSpPr txBox="1"/>
           <p:nvPr>
             <p:ph idx="1" type="body"/>
@@ -10916,8 +10905,8 @@
         </p:nvSpPr>
         <p:spPr>
           <a:xfrm>
-            <a:off x="1297500" y="1567550"/>
-            <a:ext cx="7038900" cy="2911200"/>
+            <a:off x="1132900" y="1011500"/>
+            <a:ext cx="3307800" cy="4015800"/>
           </a:xfrm>
           <a:prstGeom prst="rect">
             <a:avLst/>
@@ -10925,13 +10914,110 @@
         </p:spPr>
         <p:txBody>
           <a:bodyPr anchorCtr="0" anchor="t" bIns="91425" lIns="91425" spcFirstLastPara="1" rIns="91425" wrap="square" tIns="91425">
-            <a:normAutofit/>
+            <a:normAutofit fontScale="70000" lnSpcReduction="20000"/>
           </a:bodyPr>
           <a:lstStyle/>
           <a:p>
             <a:pPr indent="0" lvl="0" marL="0" rtl="0" algn="l">
               <a:spcBef>
                 <a:spcPts val="0"/>
+              </a:spcBef>
+              <a:spcAft>
+                <a:spcPts val="0"/>
+              </a:spcAft>
+              <a:buNone/>
+            </a:pPr>
+            <a:r>
+              <a:rPr b="1" lang="en" sz="1800"/>
+              <a:t>polio/diphtheria/measles</a:t>
+            </a:r>
+            <a:endParaRPr b="1" sz="1800"/>
+          </a:p>
+          <a:p>
+            <a:pPr indent="-308610" lvl="0" marL="457200" rtl="0" algn="l">
+              <a:spcBef>
+                <a:spcPts val="1200"/>
+              </a:spcBef>
+              <a:spcAft>
+                <a:spcPts val="0"/>
+              </a:spcAft>
+              <a:buSzPct val="100000"/>
+              <a:buChar char="●"/>
+            </a:pPr>
+            <a:r>
+              <a:rPr lang="en" sz="1800"/>
+              <a:t>Definition:  first dose coverage among 1-year olds (%)</a:t>
+            </a:r>
+            <a:endParaRPr sz="1800"/>
+          </a:p>
+          <a:p>
+            <a:pPr indent="0" lvl="0" marL="457200" rtl="0" algn="l">
+              <a:spcBef>
+                <a:spcPts val="1200"/>
+              </a:spcBef>
+              <a:spcAft>
+                <a:spcPts val="0"/>
+              </a:spcAft>
+              <a:buNone/>
+            </a:pPr>
+            <a:r>
+              <a:t/>
+            </a:r>
+            <a:endParaRPr sz="1800"/>
+          </a:p>
+          <a:p>
+            <a:pPr indent="-308610" lvl="0" marL="457200" rtl="0" algn="l">
+              <a:spcBef>
+                <a:spcPts val="1200"/>
+              </a:spcBef>
+              <a:spcAft>
+                <a:spcPts val="0"/>
+              </a:spcAft>
+              <a:buSzPct val="100000"/>
+              <a:buChar char="●"/>
+            </a:pPr>
+            <a:r>
+              <a:rPr lang="en" sz="1800"/>
+              <a:t>In researching, I found the distributions for these individual variables were near identical, leading me to believe (and later confirm) that each of these vaccinations are typically given at the same time.  </a:t>
+            </a:r>
+            <a:endParaRPr sz="1800"/>
+          </a:p>
+          <a:p>
+            <a:pPr indent="0" lvl="0" marL="457200" rtl="0" algn="l">
+              <a:spcBef>
+                <a:spcPts val="1200"/>
+              </a:spcBef>
+              <a:spcAft>
+                <a:spcPts val="0"/>
+              </a:spcAft>
+              <a:buNone/>
+            </a:pPr>
+            <a:r>
+              <a:t/>
+            </a:r>
+            <a:endParaRPr sz="1800"/>
+          </a:p>
+          <a:p>
+            <a:pPr indent="-308610" lvl="0" marL="457200" rtl="0" algn="l">
+              <a:spcBef>
+                <a:spcPts val="1200"/>
+              </a:spcBef>
+              <a:spcAft>
+                <a:spcPts val="0"/>
+              </a:spcAft>
+              <a:buSzPct val="100000"/>
+              <a:buChar char="●"/>
+            </a:pPr>
+            <a:r>
+              <a:rPr lang="en" sz="1800"/>
+              <a:t>These distributions are very negatively skewed with the mean being 86% (yay for the children!)</a:t>
+            </a:r>
+            <a:endParaRPr sz="1800"/>
+          </a:p>
+          <a:p>
+            <a:pPr indent="0" lvl="0" marL="0" rtl="0" algn="l">
+              <a:spcBef>
+                <a:spcPts val="1200"/>
               </a:spcBef>
               <a:spcAft>
                 <a:spcPts val="1200"/>
@@ -10945,6 +11031,90 @@
           </a:p>
         </p:txBody>
       </p:sp>
+      <p:pic>
+        <p:nvPicPr>
+          <p:cNvPr id="162" name="Google Shape;162;p17"/>
+          <p:cNvPicPr preferRelativeResize="0"/>
+          <p:nvPr/>
+        </p:nvPicPr>
+        <p:blipFill>
+          <a:blip r:embed="rId3">
+            <a:alphaModFix/>
+          </a:blip>
+          <a:stretch>
+            <a:fillRect/>
+          </a:stretch>
+        </p:blipFill>
+        <p:spPr>
+          <a:xfrm>
+            <a:off x="5704025" y="393760"/>
+            <a:ext cx="3307800" cy="2315464"/>
+          </a:xfrm>
+          <a:prstGeom prst="rect">
+            <a:avLst/>
+          </a:prstGeom>
+          <a:noFill/>
+          <a:ln>
+            <a:noFill/>
+          </a:ln>
+        </p:spPr>
+      </p:pic>
+      <p:pic>
+        <p:nvPicPr>
+          <p:cNvPr id="163" name="Google Shape;163;p17"/>
+          <p:cNvPicPr preferRelativeResize="0"/>
+          <p:nvPr/>
+        </p:nvPicPr>
+        <p:blipFill>
+          <a:blip r:embed="rId4">
+            <a:alphaModFix/>
+          </a:blip>
+          <a:stretch>
+            <a:fillRect/>
+          </a:stretch>
+        </p:blipFill>
+        <p:spPr>
+          <a:xfrm>
+            <a:off x="4350325" y="2335624"/>
+            <a:ext cx="3128207" cy="2129477"/>
+          </a:xfrm>
+          <a:prstGeom prst="rect">
+            <a:avLst/>
+          </a:prstGeom>
+          <a:noFill/>
+          <a:ln>
+            <a:noFill/>
+          </a:ln>
+        </p:spPr>
+      </p:pic>
+      <p:pic>
+        <p:nvPicPr>
+          <p:cNvPr id="164" name="Google Shape;164;p17"/>
+          <p:cNvPicPr preferRelativeResize="0"/>
+          <p:nvPr/>
+        </p:nvPicPr>
+        <p:blipFill>
+          <a:blip r:embed="rId5">
+            <a:alphaModFix/>
+          </a:blip>
+          <a:stretch>
+            <a:fillRect/>
+          </a:stretch>
+        </p:blipFill>
+        <p:spPr>
+          <a:xfrm>
+            <a:off x="6007746" y="2982319"/>
+            <a:ext cx="3004073" cy="1962800"/>
+          </a:xfrm>
+          <a:prstGeom prst="rect">
+            <a:avLst/>
+          </a:prstGeom>
+          <a:noFill/>
+          <a:ln>
+            <a:noFill/>
+          </a:ln>
+        </p:spPr>
+      </p:pic>
     </p:spTree>
   </p:cSld>
   <p:clrMapOvr>
@@ -10958,7 +11128,7 @@
   <p:cSld>
     <p:spTree>
       <p:nvGrpSpPr>
-        <p:cNvPr id="163" name="Shape 163"/>
+        <p:cNvPr id="168" name="Shape 168"/>
         <p:cNvGrpSpPr/>
         <p:nvPr/>
       </p:nvGrpSpPr>
@@ -10972,7 +11142,7 @@
       </p:grpSpPr>
       <p:sp>
         <p:nvSpPr>
-          <p:cNvPr id="164" name="Google Shape;164;p18"/>
+          <p:cNvPr id="169" name="Google Shape;169;p18"/>
           <p:cNvSpPr txBox="1"/>
           <p:nvPr>
             <p:ph type="title"/>
@@ -11012,7 +11182,7 @@
       </p:sp>
       <p:sp>
         <p:nvSpPr>
-          <p:cNvPr id="165" name="Google Shape;165;p18"/>
+          <p:cNvPr id="170" name="Google Shape;170;p18"/>
           <p:cNvSpPr txBox="1"/>
           <p:nvPr>
             <p:ph idx="1" type="body"/>
@@ -11020,8 +11190,8 @@
         </p:nvSpPr>
         <p:spPr>
           <a:xfrm>
-            <a:off x="1297500" y="1567550"/>
-            <a:ext cx="7038900" cy="2911200"/>
+            <a:off x="1132900" y="1011500"/>
+            <a:ext cx="3307800" cy="4015800"/>
           </a:xfrm>
           <a:prstGeom prst="rect">
             <a:avLst/>
@@ -11029,13 +11199,90 @@
         </p:spPr>
         <p:txBody>
           <a:bodyPr anchorCtr="0" anchor="t" bIns="91425" lIns="91425" spcFirstLastPara="1" rIns="91425" wrap="square" tIns="91425">
-            <a:normAutofit/>
+            <a:normAutofit fontScale="70000" lnSpcReduction="10000"/>
           </a:bodyPr>
           <a:lstStyle/>
           <a:p>
             <a:pPr indent="0" lvl="0" marL="0" rtl="0" algn="l">
               <a:spcBef>
                 <a:spcPts val="0"/>
+              </a:spcBef>
+              <a:spcAft>
+                <a:spcPts val="0"/>
+              </a:spcAft>
+              <a:buNone/>
+            </a:pPr>
+            <a:r>
+              <a:rPr b="1" lang="en" sz="1800"/>
+              <a:t>Youth obesity</a:t>
+            </a:r>
+            <a:endParaRPr b="1" sz="1800"/>
+          </a:p>
+          <a:p>
+            <a:pPr indent="-308610" lvl="0" marL="457200" rtl="0" algn="l">
+              <a:spcBef>
+                <a:spcPts val="1200"/>
+              </a:spcBef>
+              <a:spcAft>
+                <a:spcPts val="0"/>
+              </a:spcAft>
+              <a:buSzPct val="100000"/>
+              <a:buChar char="●"/>
+            </a:pPr>
+            <a:r>
+              <a:rPr lang="en" sz="1800"/>
+              <a:t>Definition:  </a:t>
+            </a:r>
+            <a:r>
+              <a:rPr lang="en" sz="1800"/>
+              <a:t>This variable represents the  prevalence of obesity in youth and is measured by a crude estimate percentage for children with a BMI &gt; (median - 2 stdev)</a:t>
+            </a:r>
+            <a:endParaRPr sz="1800"/>
+          </a:p>
+          <a:p>
+            <a:pPr indent="0" lvl="0" marL="457200" rtl="0" algn="l">
+              <a:spcBef>
+                <a:spcPts val="1200"/>
+              </a:spcBef>
+              <a:spcAft>
+                <a:spcPts val="0"/>
+              </a:spcAft>
+              <a:buNone/>
+            </a:pPr>
+            <a:r>
+              <a:t/>
+            </a:r>
+            <a:endParaRPr sz="1800"/>
+          </a:p>
+          <a:p>
+            <a:pPr indent="-308610" lvl="0" marL="457200" rtl="0" algn="l">
+              <a:spcBef>
+                <a:spcPts val="1200"/>
+              </a:spcBef>
+              <a:spcAft>
+                <a:spcPts val="0"/>
+              </a:spcAft>
+              <a:buSzPct val="100000"/>
+              <a:buChar char="●"/>
+            </a:pPr>
+            <a:r>
+              <a:rPr lang="en" sz="1800"/>
+              <a:t>This </a:t>
+            </a:r>
+            <a:r>
+              <a:rPr lang="en" sz="1800"/>
+              <a:t>distribution</a:t>
+            </a:r>
+            <a:r>
+              <a:rPr lang="en" sz="1800"/>
+              <a:t> is positively skewed and has a very long tail for percentages above 15%.  There were some outliers above the 20 mark, but I did not find them to be inaccurate (&gt; 30 is considered obese) so I left these outliers in the dataset. </a:t>
+            </a:r>
+            <a:endParaRPr sz="1800"/>
+          </a:p>
+          <a:p>
+            <a:pPr indent="0" lvl="0" marL="0" rtl="0" algn="l">
+              <a:spcBef>
+                <a:spcPts val="1200"/>
               </a:spcBef>
               <a:spcAft>
                 <a:spcPts val="1200"/>
@@ -11049,6 +11296,34 @@
           </a:p>
         </p:txBody>
       </p:sp>
+      <p:pic>
+        <p:nvPicPr>
+          <p:cNvPr id="171" name="Google Shape;171;p18"/>
+          <p:cNvPicPr preferRelativeResize="0"/>
+          <p:nvPr/>
+        </p:nvPicPr>
+        <p:blipFill>
+          <a:blip r:embed="rId3">
+            <a:alphaModFix/>
+          </a:blip>
+          <a:stretch>
+            <a:fillRect/>
+          </a:stretch>
+        </p:blipFill>
+        <p:spPr>
+          <a:xfrm>
+            <a:off x="4572000" y="1307850"/>
+            <a:ext cx="4398500" cy="2922080"/>
+          </a:xfrm>
+          <a:prstGeom prst="rect">
+            <a:avLst/>
+          </a:prstGeom>
+          <a:noFill/>
+          <a:ln>
+            <a:noFill/>
+          </a:ln>
+        </p:spPr>
+      </p:pic>
     </p:spTree>
   </p:cSld>
   <p:clrMapOvr>
@@ -11062,7 +11337,7 @@
   <p:cSld>
     <p:spTree>
       <p:nvGrpSpPr>
-        <p:cNvPr id="169" name="Shape 169"/>
+        <p:cNvPr id="175" name="Shape 175"/>
         <p:cNvGrpSpPr/>
         <p:nvPr/>
       </p:nvGrpSpPr>
@@ -11076,7 +11351,7 @@
       </p:grpSpPr>
       <p:sp>
         <p:nvSpPr>
-          <p:cNvPr id="170" name="Google Shape;170;p19"/>
+          <p:cNvPr id="176" name="Google Shape;176;p19"/>
           <p:cNvSpPr txBox="1"/>
           <p:nvPr>
             <p:ph type="title"/>
@@ -11116,7 +11391,7 @@
       </p:sp>
       <p:sp>
         <p:nvSpPr>
-          <p:cNvPr id="171" name="Google Shape;171;p19"/>
+          <p:cNvPr id="177" name="Google Shape;177;p19"/>
           <p:cNvSpPr txBox="1"/>
           <p:nvPr>
             <p:ph idx="1" type="body"/>
@@ -11124,8 +11399,8 @@
         </p:nvSpPr>
         <p:spPr>
           <a:xfrm>
-            <a:off x="1297500" y="1567550"/>
-            <a:ext cx="7038900" cy="2911200"/>
+            <a:off x="1132900" y="1011500"/>
+            <a:ext cx="3307800" cy="4015800"/>
           </a:xfrm>
           <a:prstGeom prst="rect">
             <a:avLst/>
@@ -11133,7 +11408,7 @@
         </p:spPr>
         <p:txBody>
           <a:bodyPr anchorCtr="0" anchor="t" bIns="91425" lIns="91425" spcFirstLastPara="1" rIns="91425" wrap="square" tIns="91425">
-            <a:normAutofit/>
+            <a:normAutofit lnSpcReduction="10000"/>
           </a:bodyPr>
           <a:lstStyle/>
           <a:p>
@@ -11142,17 +11417,122 @@
                 <a:spcPts val="0"/>
               </a:spcBef>
               <a:spcAft>
+                <a:spcPts val="0"/>
+              </a:spcAft>
+              <a:buNone/>
+            </a:pPr>
+            <a:r>
+              <a:rPr b="1" lang="en" sz="1250"/>
+              <a:t>Government Health Expenditure</a:t>
+            </a:r>
+            <a:endParaRPr b="1" sz="1250"/>
+          </a:p>
+          <a:p>
+            <a:pPr indent="-307975" lvl="0" marL="457200" rtl="0" algn="l">
+              <a:spcBef>
                 <a:spcPts val="1200"/>
+              </a:spcBef>
+              <a:spcAft>
+                <a:spcPts val="0"/>
+              </a:spcAft>
+              <a:buSzPts val="1250"/>
+              <a:buChar char="●"/>
+            </a:pPr>
+            <a:r>
+              <a:rPr lang="en" sz="1250"/>
+              <a:t>Definition:  This variable measures the </a:t>
+            </a:r>
+            <a:r>
+              <a:rPr lang="en" sz="1250"/>
+              <a:t>domestic general government health expenditure (GGHE-D) as percentage of gross domestic product (GDP)</a:t>
+            </a:r>
+            <a:endParaRPr sz="1250"/>
+          </a:p>
+          <a:p>
+            <a:pPr indent="0" lvl="0" marL="457200" rtl="0" algn="l">
+              <a:spcBef>
+                <a:spcPts val="1200"/>
+              </a:spcBef>
+              <a:spcAft>
+                <a:spcPts val="0"/>
               </a:spcAft>
               <a:buNone/>
             </a:pPr>
             <a:r>
               <a:t/>
             </a:r>
-            <a:endParaRPr/>
+            <a:endParaRPr sz="1250"/>
+          </a:p>
+          <a:p>
+            <a:pPr indent="-307975" lvl="0" marL="457200" rtl="0" algn="l">
+              <a:spcBef>
+                <a:spcPts val="1200"/>
+              </a:spcBef>
+              <a:spcAft>
+                <a:spcPts val="0"/>
+              </a:spcAft>
+              <a:buSzPts val="1250"/>
+              <a:buChar char="●"/>
+            </a:pPr>
+            <a:r>
+              <a:rPr lang="en" sz="1250"/>
+              <a:t>Depending on the </a:t>
+            </a:r>
+            <a:r>
+              <a:rPr lang="en" sz="1250"/>
+              <a:t>number</a:t>
+            </a:r>
+            <a:r>
+              <a:rPr lang="en" sz="1250"/>
+              <a:t> of bins in the histogram, this distribution is _almost_ bimodal, but it smooths out with more  bins.   There is a very long tail of expenditures in the +10% range, but I was able to identify that those values are correct and not outliers do to error or poor quality data.</a:t>
+            </a:r>
+            <a:endParaRPr sz="1250"/>
+          </a:p>
+          <a:p>
+            <a:pPr indent="0" lvl="0" marL="0" rtl="0" algn="l">
+              <a:spcBef>
+                <a:spcPts val="1200"/>
+              </a:spcBef>
+              <a:spcAft>
+                <a:spcPts val="1200"/>
+              </a:spcAft>
+              <a:buNone/>
+            </a:pPr>
+            <a:r>
+              <a:t/>
+            </a:r>
+            <a:endParaRPr sz="1250"/>
           </a:p>
         </p:txBody>
       </p:sp>
+      <p:pic>
+        <p:nvPicPr>
+          <p:cNvPr id="178" name="Google Shape;178;p19"/>
+          <p:cNvPicPr preferRelativeResize="0"/>
+          <p:nvPr/>
+        </p:nvPicPr>
+        <p:blipFill>
+          <a:blip r:embed="rId3">
+            <a:alphaModFix/>
+          </a:blip>
+          <a:stretch>
+            <a:fillRect/>
+          </a:stretch>
+        </p:blipFill>
+        <p:spPr>
+          <a:xfrm>
+            <a:off x="4572000" y="1307850"/>
+            <a:ext cx="4398500" cy="3195057"/>
+          </a:xfrm>
+          <a:prstGeom prst="rect">
+            <a:avLst/>
+          </a:prstGeom>
+          <a:noFill/>
+          <a:ln>
+            <a:noFill/>
+          </a:ln>
+        </p:spPr>
+      </p:pic>
     </p:spTree>
   </p:cSld>
   <p:clrMapOvr>
@@ -11166,7 +11546,7 @@
   <p:cSld>
     <p:spTree>
       <p:nvGrpSpPr>
-        <p:cNvPr id="175" name="Shape 175"/>
+        <p:cNvPr id="182" name="Shape 182"/>
         <p:cNvGrpSpPr/>
         <p:nvPr/>
       </p:nvGrpSpPr>
@@ -11180,7 +11560,7 @@
       </p:grpSpPr>
       <p:sp>
         <p:nvSpPr>
-          <p:cNvPr id="176" name="Google Shape;176;p20"/>
+          <p:cNvPr id="183" name="Google Shape;183;p20"/>
           <p:cNvSpPr txBox="1"/>
           <p:nvPr>
             <p:ph type="title"/>
@@ -11212,7 +11592,7 @@
             </a:pPr>
             <a:r>
               <a:rPr lang="en"/>
-              <a:t>Scenario Comparison (using a PMF)</a:t>
+              <a:t>Examining Analytical Distributions via a CDF</a:t>
             </a:r>
             <a:endParaRPr/>
           </a:p>
@@ -11220,7 +11600,7 @@
       </p:sp>
       <p:sp>
         <p:nvSpPr>
-          <p:cNvPr id="177" name="Google Shape;177;p20"/>
+          <p:cNvPr id="184" name="Google Shape;184;p20"/>
           <p:cNvSpPr txBox="1"/>
           <p:nvPr>
             <p:ph idx="1" type="body"/>
@@ -11229,7 +11609,7 @@
         <p:spPr>
           <a:xfrm>
             <a:off x="1297500" y="1567550"/>
-            <a:ext cx="7038900" cy="2911200"/>
+            <a:ext cx="4437600" cy="2911200"/>
           </a:xfrm>
           <a:prstGeom prst="rect">
             <a:avLst/>
@@ -11246,6 +11626,42 @@
                 <a:spcPts val="0"/>
               </a:spcBef>
               <a:spcAft>
+                <a:spcPts val="0"/>
+              </a:spcAft>
+              <a:buNone/>
+            </a:pPr>
+            <a:r>
+              <a:rPr lang="en" sz="1400"/>
+              <a:t>Over half of life expectancies are 60+ years.  </a:t>
+            </a:r>
+            <a:endParaRPr sz="1400"/>
+          </a:p>
+          <a:p>
+            <a:pPr indent="0" lvl="0" marL="0" rtl="0" algn="l">
+              <a:spcBef>
+                <a:spcPts val="1200"/>
+              </a:spcBef>
+              <a:spcAft>
+                <a:spcPts val="0"/>
+              </a:spcAft>
+              <a:buNone/>
+            </a:pPr>
+            <a:r>
+              <a:rPr lang="en" sz="1400"/>
+              <a:t>When comparing the CDF of life expectancy to a log normal model, there is a clearly visible steep increase in 70-75 age range, indicating a more rapid increase in cumulative </a:t>
+            </a:r>
+            <a:r>
+              <a:rPr lang="en" sz="1400"/>
+              <a:t>probabilities.</a:t>
+            </a:r>
+            <a:endParaRPr sz="1400"/>
+          </a:p>
+          <a:p>
+            <a:pPr indent="0" lvl="0" marL="0" rtl="0" algn="l">
+              <a:spcBef>
+                <a:spcPts val="1200"/>
+              </a:spcBef>
+              <a:spcAft>
                 <a:spcPts val="1200"/>
               </a:spcAft>
               <a:buNone/>
@@ -11257,6 +11673,62 @@
           </a:p>
         </p:txBody>
       </p:sp>
+      <p:pic>
+        <p:nvPicPr>
+          <p:cNvPr id="185" name="Google Shape;185;p20"/>
+          <p:cNvPicPr preferRelativeResize="0"/>
+          <p:nvPr/>
+        </p:nvPicPr>
+        <p:blipFill>
+          <a:blip r:embed="rId3">
+            <a:alphaModFix/>
+          </a:blip>
+          <a:stretch>
+            <a:fillRect/>
+          </a:stretch>
+        </p:blipFill>
+        <p:spPr>
+          <a:xfrm>
+            <a:off x="6152374" y="859774"/>
+            <a:ext cx="2630975" cy="1938350"/>
+          </a:xfrm>
+          <a:prstGeom prst="rect">
+            <a:avLst/>
+          </a:prstGeom>
+          <a:noFill/>
+          <a:ln>
+            <a:noFill/>
+          </a:ln>
+        </p:spPr>
+      </p:pic>
+      <p:pic>
+        <p:nvPicPr>
+          <p:cNvPr id="186" name="Google Shape;186;p20"/>
+          <p:cNvPicPr preferRelativeResize="0"/>
+          <p:nvPr/>
+        </p:nvPicPr>
+        <p:blipFill>
+          <a:blip r:embed="rId4">
+            <a:alphaModFix/>
+          </a:blip>
+          <a:stretch>
+            <a:fillRect/>
+          </a:stretch>
+        </p:blipFill>
+        <p:spPr>
+          <a:xfrm>
+            <a:off x="6152375" y="2891775"/>
+            <a:ext cx="2630975" cy="2016350"/>
+          </a:xfrm>
+          <a:prstGeom prst="rect">
+            <a:avLst/>
+          </a:prstGeom>
+          <a:noFill/>
+          <a:ln>
+            <a:noFill/>
+          </a:ln>
+        </p:spPr>
+      </p:pic>
     </p:spTree>
   </p:cSld>
   <p:clrMapOvr>
@@ -11270,7 +11742,7 @@
   <p:cSld>
     <p:spTree>
       <p:nvGrpSpPr>
-        <p:cNvPr id="181" name="Shape 181"/>
+        <p:cNvPr id="190" name="Shape 190"/>
         <p:cNvGrpSpPr/>
         <p:nvPr/>
       </p:nvGrpSpPr>
@@ -11284,7 +11756,7 @@
       </p:grpSpPr>
       <p:sp>
         <p:nvSpPr>
-          <p:cNvPr id="182" name="Google Shape;182;p21"/>
+          <p:cNvPr id="191" name="Google Shape;191;p21"/>
           <p:cNvSpPr txBox="1"/>
           <p:nvPr>
             <p:ph type="title"/>
@@ -11316,7 +11788,7 @@
             </a:pPr>
             <a:r>
               <a:rPr lang="en"/>
-              <a:t>Examining Variable with a CDF</a:t>
+              <a:t>Scatter Plots</a:t>
             </a:r>
             <a:endParaRPr/>
           </a:p>
@@ -11324,7 +11796,7 @@
       </p:sp>
       <p:sp>
         <p:nvSpPr>
-          <p:cNvPr id="183" name="Google Shape;183;p21"/>
+          <p:cNvPr id="192" name="Google Shape;192;p21"/>
           <p:cNvSpPr txBox="1"/>
           <p:nvPr>
             <p:ph idx="1" type="body"/>
@@ -11333,7 +11805,7 @@
         <p:spPr>
           <a:xfrm>
             <a:off x="1297500" y="1567550"/>
-            <a:ext cx="7038900" cy="2911200"/>
+            <a:ext cx="3512100" cy="2911200"/>
           </a:xfrm>
           <a:prstGeom prst="rect">
             <a:avLst/>
@@ -11350,7 +11822,23 @@
                 <a:spcPts val="0"/>
               </a:spcBef>
               <a:spcAft>
+                <a:spcPts val="0"/>
+              </a:spcAft>
+              <a:buNone/>
+            </a:pPr>
+            <a:r>
+              <a:rPr lang="en"/>
+              <a:t>There was a strong positive correlation between life expectancy and the expenditure of a government’s budget on healthcare. </a:t>
+            </a:r>
+            <a:endParaRPr/>
+          </a:p>
+          <a:p>
+            <a:pPr indent="0" lvl="0" marL="0" rtl="0" algn="l">
+              <a:spcBef>
                 <a:spcPts val="1200"/>
+              </a:spcBef>
+              <a:spcAft>
+                <a:spcPts val="0"/>
               </a:spcAft>
               <a:buNone/>
             </a:pPr>
@@ -11359,8 +11847,52 @@
             </a:r>
             <a:endParaRPr/>
           </a:p>
+          <a:p>
+            <a:pPr indent="0" lvl="0" marL="0" rtl="0" algn="l">
+              <a:spcBef>
+                <a:spcPts val="1200"/>
+              </a:spcBef>
+              <a:spcAft>
+                <a:spcPts val="1200"/>
+              </a:spcAft>
+              <a:buNone/>
+            </a:pPr>
+            <a:r>
+              <a:rPr lang="en"/>
+              <a:t>Both spearman and Pearson correlations showed that there was a statistical significance to this correlation, but it was minor. </a:t>
+            </a:r>
+            <a:endParaRPr/>
+          </a:p>
         </p:txBody>
       </p:sp>
+      <p:pic>
+        <p:nvPicPr>
+          <p:cNvPr id="193" name="Google Shape;193;p21"/>
+          <p:cNvPicPr preferRelativeResize="0"/>
+          <p:nvPr/>
+        </p:nvPicPr>
+        <p:blipFill>
+          <a:blip r:embed="rId3">
+            <a:alphaModFix/>
+          </a:blip>
+          <a:stretch>
+            <a:fillRect/>
+          </a:stretch>
+        </p:blipFill>
+        <p:spPr>
+          <a:xfrm>
+            <a:off x="5107522" y="991275"/>
+            <a:ext cx="3512099" cy="3662925"/>
+          </a:xfrm>
+          <a:prstGeom prst="rect">
+            <a:avLst/>
+          </a:prstGeom>
+          <a:noFill/>
+          <a:ln>
+            <a:noFill/>
+          </a:ln>
+        </p:spPr>
+      </p:pic>
     </p:spTree>
   </p:cSld>
   <p:clrMapOvr>
@@ -11370,6 +11902,285 @@
 </file>
 
 <file path=ppt/theme/theme1.xml><?xml version="1.0" encoding="utf-8"?>
+<a:theme xmlns:a="http://schemas.openxmlformats.org/drawingml/2006/main" xmlns:r="http://schemas.openxmlformats.org/officeDocument/2006/relationships">
+  <a:themeElements>
+    <a:clrScheme name="Default">
+      <a:dk1>
+        <a:srgbClr val="000000"/>
+      </a:dk1>
+      <a:lt1>
+        <a:srgbClr val="FFFFFF"/>
+      </a:lt1>
+      <a:dk2>
+        <a:srgbClr val="158158"/>
+      </a:dk2>
+      <a:lt2>
+        <a:srgbClr val="F3F3F3"/>
+      </a:lt2>
+      <a:accent1>
+        <a:srgbClr val="058DC7"/>
+      </a:accent1>
+      <a:accent2>
+        <a:srgbClr val="50B432"/>
+      </a:accent2>
+      <a:accent3>
+        <a:srgbClr val="ED561B"/>
+      </a:accent3>
+      <a:accent4>
+        <a:srgbClr val="EDEF00"/>
+      </a:accent4>
+      <a:accent5>
+        <a:srgbClr val="24CBE5"/>
+      </a:accent5>
+      <a:accent6>
+        <a:srgbClr val="64E572"/>
+      </a:accent6>
+      <a:hlink>
+        <a:srgbClr val="2200CC"/>
+      </a:hlink>
+      <a:folHlink>
+        <a:srgbClr val="551A8B"/>
+      </a:folHlink>
+    </a:clrScheme>
+    <a:fontScheme name="Office">
+      <a:majorFont>
+        <a:latin typeface="Arial"/>
+        <a:ea typeface=""/>
+        <a:cs typeface=""/>
+        <a:font script="Jpan" typeface="ＭＳ Ｐゴシック"/>
+        <a:font script="Hang" typeface="맑은 고딕"/>
+        <a:font script="Hans" typeface="宋体"/>
+        <a:font script="Hant" typeface="新細明體"/>
+        <a:font script="Arab" typeface="Times New Roman"/>
+        <a:font script="Hebr" typeface="Times New Roman"/>
+        <a:font script="Thai" typeface="Angsana New"/>
+        <a:font script="Ethi" typeface="Nyala"/>
+        <a:font script="Beng" typeface="Vrinda"/>
+        <a:font script="Gujr" typeface="Shruti"/>
+        <a:font script="Khmr" typeface="MoolBoran"/>
+        <a:font script="Knda" typeface="Tunga"/>
+        <a:font script="Guru" typeface="Raavi"/>
+        <a:font script="Cans" typeface="Euphemia"/>
+        <a:font script="Cher" typeface="Plantagenet Cherokee"/>
+        <a:font script="Yiii" typeface="Microsoft Yi Baiti"/>
+        <a:font script="Tibt" typeface="Microsoft Himalaya"/>
+        <a:font script="Thaa" typeface="MV Boli"/>
+        <a:font script="Deva" typeface="Mangal"/>
+        <a:font script="Telu" typeface="Gautami"/>
+        <a:font script="Taml" typeface="Latha"/>
+        <a:font script="Syrc" typeface="Estrangelo Edessa"/>
+        <a:font script="Orya" typeface="Kalinga"/>
+        <a:font script="Mlym" typeface="Kartika"/>
+        <a:font script="Laoo" typeface="DokChampa"/>
+        <a:font script="Sinh" typeface="Iskoola Pota"/>
+        <a:font script="Mong" typeface="Mongolian Baiti"/>
+        <a:font script="Viet" typeface="Times New Roman"/>
+        <a:font script="Uigh" typeface="Microsoft Uighur"/>
+        <a:font script="Geor" typeface="Sylfaen"/>
+      </a:majorFont>
+      <a:minorFont>
+        <a:latin typeface="Arial"/>
+        <a:ea typeface=""/>
+        <a:cs typeface=""/>
+        <a:font script="Jpan" typeface="ＭＳ Ｐゴシック"/>
+        <a:font script="Hang" typeface="맑은 고딕"/>
+        <a:font script="Hans" typeface="宋体"/>
+        <a:font script="Hant" typeface="新細明體"/>
+        <a:font script="Arab" typeface="Arial"/>
+        <a:font script="Hebr" typeface="Arial"/>
+        <a:font script="Thai" typeface="Cordia New"/>
+        <a:font script="Ethi" typeface="Nyala"/>
+        <a:font script="Beng" typeface="Vrinda"/>
+        <a:font script="Gujr" typeface="Shruti"/>
+        <a:font script="Khmr" typeface="DaunPenh"/>
+        <a:font script="Knda" typeface="Tunga"/>
+        <a:font script="Guru" typeface="Raavi"/>
+        <a:font script="Cans" typeface="Euphemia"/>
+        <a:font script="Cher" typeface="Plantagenet Cherokee"/>
+        <a:font script="Yiii" typeface="Microsoft Yi Baiti"/>
+        <a:font script="Tibt" typeface="Microsoft Himalaya"/>
+        <a:font script="Thaa" typeface="MV Boli"/>
+        <a:font script="Deva" typeface="Mangal"/>
+        <a:font script="Telu" typeface="Gautami"/>
+        <a:font script="Taml" typeface="Latha"/>
+        <a:font script="Syrc" typeface="Estrangelo Edessa"/>
+        <a:font script="Orya" typeface="Kalinga"/>
+        <a:font script="Mlym" typeface="Kartika"/>
+        <a:font script="Laoo" typeface="DokChampa"/>
+        <a:font script="Sinh" typeface="Iskoola Pota"/>
+        <a:font script="Mong" typeface="Mongolian Baiti"/>
+        <a:font script="Viet" typeface="Arial"/>
+        <a:font script="Uigh" typeface="Microsoft Uighur"/>
+        <a:font script="Geor" typeface="Sylfaen"/>
+      </a:minorFont>
+    </a:fontScheme>
+    <a:fmtScheme name="Office">
+      <a:fillStyleLst>
+        <a:solidFill>
+          <a:schemeClr val="phClr"/>
+        </a:solidFill>
+        <a:gradFill rotWithShape="1">
+          <a:gsLst>
+            <a:gs pos="0">
+              <a:schemeClr val="phClr">
+                <a:tint val="50000"/>
+                <a:satMod val="300000"/>
+              </a:schemeClr>
+            </a:gs>
+            <a:gs pos="35000">
+              <a:schemeClr val="phClr">
+                <a:tint val="37000"/>
+                <a:satMod val="300000"/>
+              </a:schemeClr>
+            </a:gs>
+            <a:gs pos="100000">
+              <a:schemeClr val="phClr">
+                <a:tint val="15000"/>
+                <a:satMod val="350000"/>
+              </a:schemeClr>
+            </a:gs>
+          </a:gsLst>
+          <a:lin ang="16200000" scaled="1"/>
+        </a:gradFill>
+        <a:gradFill rotWithShape="1">
+          <a:gsLst>
+            <a:gs pos="0">
+              <a:schemeClr val="phClr">
+                <a:tint val="100000"/>
+                <a:shade val="100000"/>
+                <a:satMod val="130000"/>
+              </a:schemeClr>
+            </a:gs>
+            <a:gs pos="100000">
+              <a:schemeClr val="phClr">
+                <a:tint val="50000"/>
+                <a:shade val="100000"/>
+                <a:satMod val="350000"/>
+              </a:schemeClr>
+            </a:gs>
+          </a:gsLst>
+          <a:lin ang="16200000" scaled="0"/>
+        </a:gradFill>
+      </a:fillStyleLst>
+      <a:lnStyleLst>
+        <a:ln w="9525" cap="flat" cmpd="sng" algn="ctr">
+          <a:solidFill>
+            <a:schemeClr val="phClr">
+              <a:shade val="95000"/>
+              <a:satMod val="105000"/>
+            </a:schemeClr>
+          </a:solidFill>
+          <a:prstDash val="solid"/>
+        </a:ln>
+        <a:ln w="25400" cap="flat" cmpd="sng" algn="ctr">
+          <a:solidFill>
+            <a:schemeClr val="phClr"/>
+          </a:solidFill>
+          <a:prstDash val="solid"/>
+        </a:ln>
+        <a:ln w="38100" cap="flat" cmpd="sng" algn="ctr">
+          <a:solidFill>
+            <a:schemeClr val="phClr"/>
+          </a:solidFill>
+          <a:prstDash val="solid"/>
+        </a:ln>
+      </a:lnStyleLst>
+      <a:effectStyleLst>
+        <a:effectStyle>
+          <a:effectLst>
+            <a:outerShdw blurRad="40000" dist="20000" dir="5400000" rotWithShape="0">
+              <a:srgbClr val="000000">
+                <a:alpha val="38000"/>
+              </a:srgbClr>
+            </a:outerShdw>
+          </a:effectLst>
+        </a:effectStyle>
+        <a:effectStyle>
+          <a:effectLst>
+            <a:outerShdw blurRad="40000" dist="23000" dir="5400000" rotWithShape="0">
+              <a:srgbClr val="000000">
+                <a:alpha val="35000"/>
+              </a:srgbClr>
+            </a:outerShdw>
+          </a:effectLst>
+        </a:effectStyle>
+        <a:effectStyle>
+          <a:effectLst>
+            <a:outerShdw blurRad="40000" dist="23000" dir="5400000" rotWithShape="0">
+              <a:srgbClr val="000000">
+                <a:alpha val="35000"/>
+              </a:srgbClr>
+            </a:outerShdw>
+          </a:effectLst>
+          <a:scene3d>
+            <a:camera prst="orthographicFront">
+              <a:rot lat="0" lon="0" rev="0"/>
+            </a:camera>
+            <a:lightRig rig="threePt" dir="t">
+              <a:rot lat="0" lon="0" rev="1200000"/>
+            </a:lightRig>
+          </a:scene3d>
+          <a:sp3d>
+            <a:bevelT w="63500" h="25400"/>
+          </a:sp3d>
+        </a:effectStyle>
+      </a:effectStyleLst>
+      <a:bgFillStyleLst>
+        <a:solidFill>
+          <a:schemeClr val="phClr"/>
+        </a:solidFill>
+        <a:gradFill rotWithShape="1">
+          <a:gsLst>
+            <a:gs pos="0">
+              <a:schemeClr val="phClr">
+                <a:tint val="40000"/>
+                <a:satMod val="350000"/>
+              </a:schemeClr>
+            </a:gs>
+            <a:gs pos="40000">
+              <a:schemeClr val="phClr">
+                <a:tint val="45000"/>
+                <a:shade val="99000"/>
+                <a:satMod val="350000"/>
+              </a:schemeClr>
+            </a:gs>
+            <a:gs pos="100000">
+              <a:schemeClr val="phClr">
+                <a:shade val="20000"/>
+                <a:satMod val="255000"/>
+              </a:schemeClr>
+            </a:gs>
+          </a:gsLst>
+          <a:path path="circle">
+            <a:fillToRect l="50000" t="-80000" r="50000" b="180000"/>
+          </a:path>
+        </a:gradFill>
+        <a:gradFill rotWithShape="1">
+          <a:gsLst>
+            <a:gs pos="0">
+              <a:schemeClr val="phClr">
+                <a:tint val="80000"/>
+                <a:satMod val="300000"/>
+              </a:schemeClr>
+            </a:gs>
+            <a:gs pos="100000">
+              <a:schemeClr val="phClr">
+                <a:shade val="30000"/>
+                <a:satMod val="200000"/>
+              </a:schemeClr>
+            </a:gs>
+          </a:gsLst>
+          <a:path path="circle">
+            <a:fillToRect l="50000" t="50000" r="50000" b="50000"/>
+          </a:path>
+        </a:gradFill>
+      </a:bgFillStyleLst>
+    </a:fmtScheme>
+  </a:themeElements>
+</a:theme>
+</file>
+
+<file path=ppt/theme/theme2.xml><?xml version="1.0" encoding="utf-8"?>
 <a:theme xmlns:a="http://schemas.openxmlformats.org/drawingml/2006/main" xmlns:r="http://schemas.openxmlformats.org/officeDocument/2006/relationships" name="Focus">
   <a:themeElements>
     <a:clrScheme name="Focus">
@@ -11646,283 +12457,4 @@
     </a:fmtScheme>
   </a:themeElements>
 </a:theme>
-</file>
-
-<file path=ppt/theme/theme2.xml><?xml version="1.0" encoding="utf-8"?>
-<a:theme xmlns:a="http://schemas.openxmlformats.org/drawingml/2006/main" xmlns:r="http://schemas.openxmlformats.org/officeDocument/2006/relationships">
-  <a:themeElements>
-    <a:clrScheme name="Default">
-      <a:dk1>
-        <a:srgbClr val="000000"/>
-      </a:dk1>
-      <a:lt1>
-        <a:srgbClr val="FFFFFF"/>
-      </a:lt1>
-      <a:dk2>
-        <a:srgbClr val="158158"/>
-      </a:dk2>
-      <a:lt2>
-        <a:srgbClr val="F3F3F3"/>
-      </a:lt2>
-      <a:accent1>
-        <a:srgbClr val="058DC7"/>
-      </a:accent1>
-      <a:accent2>
-        <a:srgbClr val="50B432"/>
-      </a:accent2>
-      <a:accent3>
-        <a:srgbClr val="ED561B"/>
-      </a:accent3>
-      <a:accent4>
-        <a:srgbClr val="EDEF00"/>
-      </a:accent4>
-      <a:accent5>
-        <a:srgbClr val="24CBE5"/>
-      </a:accent5>
-      <a:accent6>
-        <a:srgbClr val="64E572"/>
-      </a:accent6>
-      <a:hlink>
-        <a:srgbClr val="2200CC"/>
-      </a:hlink>
-      <a:folHlink>
-        <a:srgbClr val="551A8B"/>
-      </a:folHlink>
-    </a:clrScheme>
-    <a:fontScheme name="Office">
-      <a:majorFont>
-        <a:latin typeface="Arial"/>
-        <a:ea typeface=""/>
-        <a:cs typeface=""/>
-        <a:font script="Jpan" typeface="ＭＳ Ｐゴシック"/>
-        <a:font script="Hang" typeface="맑은 고딕"/>
-        <a:font script="Hans" typeface="宋体"/>
-        <a:font script="Hant" typeface="新細明體"/>
-        <a:font script="Arab" typeface="Times New Roman"/>
-        <a:font script="Hebr" typeface="Times New Roman"/>
-        <a:font script="Thai" typeface="Angsana New"/>
-        <a:font script="Ethi" typeface="Nyala"/>
-        <a:font script="Beng" typeface="Vrinda"/>
-        <a:font script="Gujr" typeface="Shruti"/>
-        <a:font script="Khmr" typeface="MoolBoran"/>
-        <a:font script="Knda" typeface="Tunga"/>
-        <a:font script="Guru" typeface="Raavi"/>
-        <a:font script="Cans" typeface="Euphemia"/>
-        <a:font script="Cher" typeface="Plantagenet Cherokee"/>
-        <a:font script="Yiii" typeface="Microsoft Yi Baiti"/>
-        <a:font script="Tibt" typeface="Microsoft Himalaya"/>
-        <a:font script="Thaa" typeface="MV Boli"/>
-        <a:font script="Deva" typeface="Mangal"/>
-        <a:font script="Telu" typeface="Gautami"/>
-        <a:font script="Taml" typeface="Latha"/>
-        <a:font script="Syrc" typeface="Estrangelo Edessa"/>
-        <a:font script="Orya" typeface="Kalinga"/>
-        <a:font script="Mlym" typeface="Kartika"/>
-        <a:font script="Laoo" typeface="DokChampa"/>
-        <a:font script="Sinh" typeface="Iskoola Pota"/>
-        <a:font script="Mong" typeface="Mongolian Baiti"/>
-        <a:font script="Viet" typeface="Times New Roman"/>
-        <a:font script="Uigh" typeface="Microsoft Uighur"/>
-        <a:font script="Geor" typeface="Sylfaen"/>
-      </a:majorFont>
-      <a:minorFont>
-        <a:latin typeface="Arial"/>
-        <a:ea typeface=""/>
-        <a:cs typeface=""/>
-        <a:font script="Jpan" typeface="ＭＳ Ｐゴシック"/>
-        <a:font script="Hang" typeface="맑은 고딕"/>
-        <a:font script="Hans" typeface="宋体"/>
-        <a:font script="Hant" typeface="新細明體"/>
-        <a:font script="Arab" typeface="Arial"/>
-        <a:font script="Hebr" typeface="Arial"/>
-        <a:font script="Thai" typeface="Cordia New"/>
-        <a:font script="Ethi" typeface="Nyala"/>
-        <a:font script="Beng" typeface="Vrinda"/>
-        <a:font script="Gujr" typeface="Shruti"/>
-        <a:font script="Khmr" typeface="DaunPenh"/>
-        <a:font script="Knda" typeface="Tunga"/>
-        <a:font script="Guru" typeface="Raavi"/>
-        <a:font script="Cans" typeface="Euphemia"/>
-        <a:font script="Cher" typeface="Plantagenet Cherokee"/>
-        <a:font script="Yiii" typeface="Microsoft Yi Baiti"/>
-        <a:font script="Tibt" typeface="Microsoft Himalaya"/>
-        <a:font script="Thaa" typeface="MV Boli"/>
-        <a:font script="Deva" typeface="Mangal"/>
-        <a:font script="Telu" typeface="Gautami"/>
-        <a:font script="Taml" typeface="Latha"/>
-        <a:font script="Syrc" typeface="Estrangelo Edessa"/>
-        <a:font script="Orya" typeface="Kalinga"/>
-        <a:font script="Mlym" typeface="Kartika"/>
-        <a:font script="Laoo" typeface="DokChampa"/>
-        <a:font script="Sinh" typeface="Iskoola Pota"/>
-        <a:font script="Mong" typeface="Mongolian Baiti"/>
-        <a:font script="Viet" typeface="Arial"/>
-        <a:font script="Uigh" typeface="Microsoft Uighur"/>
-        <a:font script="Geor" typeface="Sylfaen"/>
-      </a:minorFont>
-    </a:fontScheme>
-    <a:fmtScheme name="Office">
-      <a:fillStyleLst>
-        <a:solidFill>
-          <a:schemeClr val="phClr"/>
-        </a:solidFill>
-        <a:gradFill rotWithShape="1">
-          <a:gsLst>
-            <a:gs pos="0">
-              <a:schemeClr val="phClr">
-                <a:tint val="50000"/>
-                <a:satMod val="300000"/>
-              </a:schemeClr>
-            </a:gs>
-            <a:gs pos="35000">
-              <a:schemeClr val="phClr">
-                <a:tint val="37000"/>
-                <a:satMod val="300000"/>
-              </a:schemeClr>
-            </a:gs>
-            <a:gs pos="100000">
-              <a:schemeClr val="phClr">
-                <a:tint val="15000"/>
-                <a:satMod val="350000"/>
-              </a:schemeClr>
-            </a:gs>
-          </a:gsLst>
-          <a:lin ang="16200000" scaled="1"/>
-        </a:gradFill>
-        <a:gradFill rotWithShape="1">
-          <a:gsLst>
-            <a:gs pos="0">
-              <a:schemeClr val="phClr">
-                <a:tint val="100000"/>
-                <a:shade val="100000"/>
-                <a:satMod val="130000"/>
-              </a:schemeClr>
-            </a:gs>
-            <a:gs pos="100000">
-              <a:schemeClr val="phClr">
-                <a:tint val="50000"/>
-                <a:shade val="100000"/>
-                <a:satMod val="350000"/>
-              </a:schemeClr>
-            </a:gs>
-          </a:gsLst>
-          <a:lin ang="16200000" scaled="0"/>
-        </a:gradFill>
-      </a:fillStyleLst>
-      <a:lnStyleLst>
-        <a:ln w="9525" cap="flat" cmpd="sng" algn="ctr">
-          <a:solidFill>
-            <a:schemeClr val="phClr">
-              <a:shade val="95000"/>
-              <a:satMod val="105000"/>
-            </a:schemeClr>
-          </a:solidFill>
-          <a:prstDash val="solid"/>
-        </a:ln>
-        <a:ln w="25400" cap="flat" cmpd="sng" algn="ctr">
-          <a:solidFill>
-            <a:schemeClr val="phClr"/>
-          </a:solidFill>
-          <a:prstDash val="solid"/>
-        </a:ln>
-        <a:ln w="38100" cap="flat" cmpd="sng" algn="ctr">
-          <a:solidFill>
-            <a:schemeClr val="phClr"/>
-          </a:solidFill>
-          <a:prstDash val="solid"/>
-        </a:ln>
-      </a:lnStyleLst>
-      <a:effectStyleLst>
-        <a:effectStyle>
-          <a:effectLst>
-            <a:outerShdw blurRad="40000" dist="20000" dir="5400000" rotWithShape="0">
-              <a:srgbClr val="000000">
-                <a:alpha val="38000"/>
-              </a:srgbClr>
-            </a:outerShdw>
-          </a:effectLst>
-        </a:effectStyle>
-        <a:effectStyle>
-          <a:effectLst>
-            <a:outerShdw blurRad="40000" dist="23000" dir="5400000" rotWithShape="0">
-              <a:srgbClr val="000000">
-                <a:alpha val="35000"/>
-              </a:srgbClr>
-            </a:outerShdw>
-          </a:effectLst>
-        </a:effectStyle>
-        <a:effectStyle>
-          <a:effectLst>
-            <a:outerShdw blurRad="40000" dist="23000" dir="5400000" rotWithShape="0">
-              <a:srgbClr val="000000">
-                <a:alpha val="35000"/>
-              </a:srgbClr>
-            </a:outerShdw>
-          </a:effectLst>
-          <a:scene3d>
-            <a:camera prst="orthographicFront">
-              <a:rot lat="0" lon="0" rev="0"/>
-            </a:camera>
-            <a:lightRig rig="threePt" dir="t">
-              <a:rot lat="0" lon="0" rev="1200000"/>
-            </a:lightRig>
-          </a:scene3d>
-          <a:sp3d>
-            <a:bevelT w="63500" h="25400"/>
-          </a:sp3d>
-        </a:effectStyle>
-      </a:effectStyleLst>
-      <a:bgFillStyleLst>
-        <a:solidFill>
-          <a:schemeClr val="phClr"/>
-        </a:solidFill>
-        <a:gradFill rotWithShape="1">
-          <a:gsLst>
-            <a:gs pos="0">
-              <a:schemeClr val="phClr">
-                <a:tint val="40000"/>
-                <a:satMod val="350000"/>
-              </a:schemeClr>
-            </a:gs>
-            <a:gs pos="40000">
-              <a:schemeClr val="phClr">
-                <a:tint val="45000"/>
-                <a:shade val="99000"/>
-                <a:satMod val="350000"/>
-              </a:schemeClr>
-            </a:gs>
-            <a:gs pos="100000">
-              <a:schemeClr val="phClr">
-                <a:shade val="20000"/>
-                <a:satMod val="255000"/>
-              </a:schemeClr>
-            </a:gs>
-          </a:gsLst>
-          <a:path path="circle">
-            <a:fillToRect l="50000" t="-80000" r="50000" b="180000"/>
-          </a:path>
-        </a:gradFill>
-        <a:gradFill rotWithShape="1">
-          <a:gsLst>
-            <a:gs pos="0">
-              <a:schemeClr val="phClr">
-                <a:tint val="80000"/>
-                <a:satMod val="300000"/>
-              </a:schemeClr>
-            </a:gs>
-            <a:gs pos="100000">
-              <a:schemeClr val="phClr">
-                <a:shade val="30000"/>
-                <a:satMod val="200000"/>
-              </a:schemeClr>
-            </a:gs>
-          </a:gsLst>
-          <a:path path="circle">
-            <a:fillToRect l="50000" t="50000" r="50000" b="50000"/>
-          </a:path>
-        </a:gradFill>
-      </a:bgFillStyleLst>
-    </a:fmtScheme>
-  </a:themeElements>
-</a:theme>
 </file>
</xml_diff>